<commit_message>
up to linkedin headshot stuff
</commit_message>
<xml_diff>
--- a/Job_Stuff/Jng_Job_Prezzie.pptx
+++ b/Job_Stuff/Jng_Job_Prezzie.pptx
@@ -10,6 +10,9 @@
     <p:sldId id="258" r:id="rId4"/>
     <p:sldId id="260" r:id="rId5"/>
     <p:sldId id="259" r:id="rId6"/>
+    <p:sldId id="261" r:id="rId7"/>
+    <p:sldId id="262" r:id="rId8"/>
+    <p:sldId id="263" r:id="rId9"/>
   </p:sldIdLst>
   <p:sldSz cx="12192000" cy="6858000"/>
   <p:notesSz cx="6858000" cy="9144000"/>
@@ -7907,11 +7910,7 @@
             </a:pPr>
             <a:r>
               <a:rPr lang="en-US" sz="2400" dirty="0" smtClean="0"/>
-              <a:t>Ideally only one follow up, use own judgment </a:t>
-            </a:r>
-            <a:r>
-              <a:rPr lang="en-US" sz="2400" smtClean="0"/>
-              <a:t>if more</a:t>
+              <a:t>Ideally only one follow up, use own judgment if more</a:t>
             </a:r>
             <a:endParaRPr lang="en-US" sz="2400" dirty="0"/>
           </a:p>
@@ -7921,6 +7920,304 @@
     <p:extLst>
       <p:ext uri="{BB962C8B-B14F-4D97-AF65-F5344CB8AC3E}">
         <p14:creationId xmlns:p14="http://schemas.microsoft.com/office/powerpoint/2010/main" val="689479517"/>
+      </p:ext>
+    </p:extLst>
+  </p:cSld>
+  <p:clrMapOvr>
+    <a:masterClrMapping/>
+  </p:clrMapOvr>
+</p:sld>
+</file>
+
+<file path=ppt/slides/slide6.xml><?xml version="1.0" encoding="utf-8"?>
+<p:sld xmlns:a="http://schemas.openxmlformats.org/drawingml/2006/main" xmlns:r="http://schemas.openxmlformats.org/officeDocument/2006/relationships" xmlns:p="http://schemas.openxmlformats.org/presentationml/2006/main">
+  <p:cSld>
+    <p:spTree>
+      <p:nvGrpSpPr>
+        <p:cNvPr id="1" name=""/>
+        <p:cNvGrpSpPr/>
+        <p:nvPr/>
+      </p:nvGrpSpPr>
+      <p:grpSpPr>
+        <a:xfrm>
+          <a:off x="0" y="0"/>
+          <a:ext cx="0" cy="0"/>
+          <a:chOff x="0" y="0"/>
+          <a:chExt cx="0" cy="0"/>
+        </a:xfrm>
+      </p:grpSpPr>
+      <p:sp>
+        <p:nvSpPr>
+          <p:cNvPr id="5" name="Title 4"/>
+          <p:cNvSpPr>
+            <a:spLocks noGrp="1"/>
+          </p:cNvSpPr>
+          <p:nvPr>
+            <p:ph type="title"/>
+          </p:nvPr>
+        </p:nvSpPr>
+        <p:spPr>
+          <a:xfrm>
+            <a:off x="1078524" y="2956772"/>
+            <a:ext cx="11113476" cy="1492132"/>
+          </a:xfrm>
+        </p:spPr>
+        <p:txBody>
+          <a:bodyPr/>
+          <a:lstStyle/>
+          <a:p>
+            <a:r>
+              <a:rPr lang="en-US" dirty="0" smtClean="0"/>
+              <a:t>Resume / </a:t>
+            </a:r>
+            <a:r>
+              <a:rPr lang="en-US" dirty="0" err="1" smtClean="0"/>
+              <a:t>Linkedin</a:t>
+            </a:r>
+            <a:r>
+              <a:rPr lang="en-US" dirty="0" smtClean="0"/>
+              <a:t> / online presence</a:t>
+            </a:r>
+            <a:endParaRPr lang="en-US" dirty="0"/>
+          </a:p>
+        </p:txBody>
+      </p:sp>
+    </p:spTree>
+    <p:extLst>
+      <p:ext uri="{BB962C8B-B14F-4D97-AF65-F5344CB8AC3E}">
+        <p14:creationId xmlns:p14="http://schemas.microsoft.com/office/powerpoint/2010/main" val="368481736"/>
+      </p:ext>
+    </p:extLst>
+  </p:cSld>
+  <p:clrMapOvr>
+    <a:masterClrMapping/>
+  </p:clrMapOvr>
+</p:sld>
+</file>
+
+<file path=ppt/slides/slide7.xml><?xml version="1.0" encoding="utf-8"?>
+<p:sld xmlns:a="http://schemas.openxmlformats.org/drawingml/2006/main" xmlns:r="http://schemas.openxmlformats.org/officeDocument/2006/relationships" xmlns:p="http://schemas.openxmlformats.org/presentationml/2006/main">
+  <p:cSld>
+    <p:spTree>
+      <p:nvGrpSpPr>
+        <p:cNvPr id="1" name=""/>
+        <p:cNvGrpSpPr/>
+        <p:nvPr/>
+      </p:nvGrpSpPr>
+      <p:grpSpPr>
+        <a:xfrm>
+          <a:off x="0" y="0"/>
+          <a:ext cx="0" cy="0"/>
+          <a:chOff x="0" y="0"/>
+          <a:chExt cx="0" cy="0"/>
+        </a:xfrm>
+      </p:grpSpPr>
+      <p:sp>
+        <p:nvSpPr>
+          <p:cNvPr id="2" name="Title 1"/>
+          <p:cNvSpPr>
+            <a:spLocks noGrp="1"/>
+          </p:cNvSpPr>
+          <p:nvPr>
+            <p:ph type="title"/>
+          </p:nvPr>
+        </p:nvSpPr>
+        <p:spPr/>
+        <p:txBody>
+          <a:bodyPr/>
+          <a:lstStyle/>
+          <a:p>
+            <a:pPr algn="ctr"/>
+            <a:r>
+              <a:rPr lang="en-US" dirty="0" smtClean="0"/>
+              <a:t>LinkedIn</a:t>
+            </a:r>
+            <a:endParaRPr lang="en-US" dirty="0"/>
+          </a:p>
+        </p:txBody>
+      </p:sp>
+      <p:sp>
+        <p:nvSpPr>
+          <p:cNvPr id="3" name="Content Placeholder 2"/>
+          <p:cNvSpPr>
+            <a:spLocks noGrp="1"/>
+          </p:cNvSpPr>
+          <p:nvPr>
+            <p:ph idx="1"/>
+          </p:nvPr>
+        </p:nvSpPr>
+        <p:spPr/>
+        <p:txBody>
+          <a:bodyPr/>
+          <a:lstStyle/>
+          <a:p>
+            <a:r>
+              <a:rPr lang="en-US" dirty="0" smtClean="0"/>
+              <a:t>Change the “notify your network” to a no. This can be done on the right hand side OR in your privacy settings</a:t>
+            </a:r>
+          </a:p>
+          <a:p>
+            <a:r>
+              <a:rPr lang="en-US" dirty="0" smtClean="0"/>
+              <a:t>Headshot / Headline</a:t>
+            </a:r>
+          </a:p>
+          <a:p>
+            <a:r>
+              <a:rPr lang="en-US" dirty="0" smtClean="0"/>
+              <a:t>Summary / Industry / URL</a:t>
+            </a:r>
+          </a:p>
+          <a:p>
+            <a:r>
+              <a:rPr lang="en-US" dirty="0" smtClean="0"/>
+              <a:t>Experience / Education</a:t>
+            </a:r>
+          </a:p>
+          <a:p>
+            <a:r>
+              <a:rPr lang="en-US" dirty="0" smtClean="0"/>
+              <a:t>Skills / Endorsements</a:t>
+            </a:r>
+          </a:p>
+          <a:p>
+            <a:r>
+              <a:rPr lang="en-US" dirty="0" smtClean="0"/>
+              <a:t>Connections / </a:t>
+            </a:r>
+            <a:r>
+              <a:rPr lang="en-US" dirty="0" err="1" smtClean="0"/>
+              <a:t>Misc</a:t>
+            </a:r>
+            <a:endParaRPr lang="en-US" dirty="0"/>
+          </a:p>
+        </p:txBody>
+      </p:sp>
+    </p:spTree>
+    <p:extLst>
+      <p:ext uri="{BB962C8B-B14F-4D97-AF65-F5344CB8AC3E}">
+        <p14:creationId xmlns:p14="http://schemas.microsoft.com/office/powerpoint/2010/main" val="1838135563"/>
+      </p:ext>
+    </p:extLst>
+  </p:cSld>
+  <p:clrMapOvr>
+    <a:masterClrMapping/>
+  </p:clrMapOvr>
+</p:sld>
+</file>
+
+<file path=ppt/slides/slide8.xml><?xml version="1.0" encoding="utf-8"?>
+<p:sld xmlns:a="http://schemas.openxmlformats.org/drawingml/2006/main" xmlns:r="http://schemas.openxmlformats.org/officeDocument/2006/relationships" xmlns:p="http://schemas.openxmlformats.org/presentationml/2006/main">
+  <p:cSld>
+    <p:spTree>
+      <p:nvGrpSpPr>
+        <p:cNvPr id="1" name=""/>
+        <p:cNvGrpSpPr/>
+        <p:nvPr/>
+      </p:nvGrpSpPr>
+      <p:grpSpPr>
+        <a:xfrm>
+          <a:off x="0" y="0"/>
+          <a:ext cx="0" cy="0"/>
+          <a:chOff x="0" y="0"/>
+          <a:chExt cx="0" cy="0"/>
+        </a:xfrm>
+      </p:grpSpPr>
+      <p:sp>
+        <p:nvSpPr>
+          <p:cNvPr id="4" name="Title 3"/>
+          <p:cNvSpPr>
+            <a:spLocks noGrp="1"/>
+          </p:cNvSpPr>
+          <p:nvPr>
+            <p:ph type="title"/>
+          </p:nvPr>
+        </p:nvSpPr>
+        <p:spPr/>
+        <p:txBody>
+          <a:bodyPr/>
+          <a:lstStyle/>
+          <a:p>
+            <a:r>
+              <a:rPr lang="en-US" dirty="0" smtClean="0"/>
+              <a:t>Headshot</a:t>
+            </a:r>
+            <a:endParaRPr lang="en-US" dirty="0"/>
+          </a:p>
+        </p:txBody>
+      </p:sp>
+      <p:sp>
+        <p:nvSpPr>
+          <p:cNvPr id="5" name="Content Placeholder 4"/>
+          <p:cNvSpPr>
+            <a:spLocks noGrp="1"/>
+          </p:cNvSpPr>
+          <p:nvPr>
+            <p:ph idx="1"/>
+          </p:nvPr>
+        </p:nvSpPr>
+        <p:spPr/>
+        <p:txBody>
+          <a:bodyPr>
+            <a:normAutofit/>
+          </a:bodyPr>
+          <a:lstStyle/>
+          <a:p>
+            <a:r>
+              <a:rPr lang="en-US" dirty="0" smtClean="0"/>
+              <a:t>This is the first thing people will see when visiting your profile</a:t>
+            </a:r>
+          </a:p>
+          <a:p>
+            <a:r>
+              <a:rPr lang="en-US" dirty="0" smtClean="0"/>
+              <a:t>Get an image that just shows your head and shoulders</a:t>
+            </a:r>
+          </a:p>
+          <a:p>
+            <a:r>
+              <a:rPr lang="en-US" dirty="0" smtClean="0"/>
+              <a:t>If it’s a more creative image feel free to use that</a:t>
+            </a:r>
+          </a:p>
+          <a:p>
+            <a:r>
+              <a:rPr lang="en-US" dirty="0" smtClean="0"/>
+              <a:t>Make sure to wear nice clothing</a:t>
+            </a:r>
+          </a:p>
+          <a:p>
+            <a:pPr lvl="1"/>
+            <a:r>
+              <a:rPr lang="en-US" dirty="0" smtClean="0"/>
+              <a:t>Clean clothing</a:t>
+            </a:r>
+          </a:p>
+          <a:p>
+            <a:pPr lvl="1"/>
+            <a:r>
+              <a:rPr lang="en-US" dirty="0" smtClean="0"/>
+              <a:t>Ironed clothing</a:t>
+            </a:r>
+          </a:p>
+          <a:p>
+            <a:pPr lvl="1"/>
+            <a:r>
+              <a:rPr lang="en-US" dirty="0" smtClean="0"/>
+              <a:t>No deep </a:t>
+            </a:r>
+            <a:r>
+              <a:rPr lang="en-US" smtClean="0"/>
+              <a:t>v-necks</a:t>
+            </a:r>
+            <a:endParaRPr lang="en-US" dirty="0" smtClean="0"/>
+          </a:p>
+        </p:txBody>
+      </p:sp>
+    </p:spTree>
+    <p:extLst>
+      <p:ext uri="{BB962C8B-B14F-4D97-AF65-F5344CB8AC3E}">
+        <p14:creationId xmlns:p14="http://schemas.microsoft.com/office/powerpoint/2010/main" val="514598276"/>
       </p:ext>
     </p:extLst>
   </p:cSld>

</xml_diff>

<commit_message>
pushing edits to job stuff
</commit_message>
<xml_diff>
--- a/Job_Stuff/Jng_Job_Prezzie.pptx
+++ b/Job_Stuff/Jng_Job_Prezzie.pptx
@@ -11,8 +11,17 @@
     <p:sldId id="260" r:id="rId5"/>
     <p:sldId id="259" r:id="rId6"/>
     <p:sldId id="261" r:id="rId7"/>
-    <p:sldId id="262" r:id="rId8"/>
-    <p:sldId id="263" r:id="rId9"/>
+    <p:sldId id="271" r:id="rId8"/>
+    <p:sldId id="272" r:id="rId9"/>
+    <p:sldId id="262" r:id="rId10"/>
+    <p:sldId id="264" r:id="rId11"/>
+    <p:sldId id="263" r:id="rId12"/>
+    <p:sldId id="265" r:id="rId13"/>
+    <p:sldId id="266" r:id="rId14"/>
+    <p:sldId id="267" r:id="rId15"/>
+    <p:sldId id="268" r:id="rId16"/>
+    <p:sldId id="269" r:id="rId17"/>
+    <p:sldId id="270" r:id="rId18"/>
   </p:sldIdLst>
   <p:sldSz cx="12192000" cy="6858000"/>
   <p:notesSz cx="6858000" cy="9144000"/>
@@ -111,6 +120,11 @@
       </a:defRPr>
     </a:lvl9pPr>
   </p:defaultTextStyle>
+  <p:extLst>
+    <p:ext uri="{EFAFB233-063F-42B5-8137-9DF3F51BA10A}">
+      <p15:sldGuideLst xmlns:p15="http://schemas.microsoft.com/office/powerpoint/2012/main"/>
+    </p:ext>
+  </p:extLst>
 </p:presentation>
 </file>
 
@@ -1326,7 +1340,7 @@
             <a:fld id="{9334D819-9F07-4261-B09B-9E467E5D9002}" type="datetimeFigureOut">
               <a:rPr lang="en-US" dirty="0"/>
               <a:pPr/>
-              <a:t>5/26/16</a:t>
+              <a:t>5/31/16</a:t>
             </a:fld>
             <a:endParaRPr lang="en-US" dirty="0"/>
           </a:p>
@@ -1560,7 +1574,7 @@
           <a:p>
             <a:fld id="{9334D819-9F07-4261-B09B-9E467E5D9002}" type="datetimeFigureOut">
               <a:rPr lang="en-US" dirty="0"/>
-              <a:t>5/26/16</a:t>
+              <a:t>5/31/16</a:t>
             </a:fld>
             <a:endParaRPr lang="en-US" dirty="0"/>
           </a:p>
@@ -1735,7 +1749,7 @@
           <a:p>
             <a:fld id="{9334D819-9F07-4261-B09B-9E467E5D9002}" type="datetimeFigureOut">
               <a:rPr lang="en-US" dirty="0"/>
-              <a:t>5/26/16</a:t>
+              <a:t>5/31/16</a:t>
             </a:fld>
             <a:endParaRPr lang="en-US" dirty="0"/>
           </a:p>
@@ -1900,7 +1914,7 @@
           <a:p>
             <a:fld id="{9334D819-9F07-4261-B09B-9E467E5D9002}" type="datetimeFigureOut">
               <a:rPr lang="en-US" dirty="0"/>
-              <a:t>5/26/16</a:t>
+              <a:t>5/31/16</a:t>
             </a:fld>
             <a:endParaRPr lang="en-US" dirty="0"/>
           </a:p>
@@ -2172,7 +2186,7 @@
             <a:fld id="{9334D819-9F07-4261-B09B-9E467E5D9002}" type="datetimeFigureOut">
               <a:rPr lang="en-US" dirty="0"/>
               <a:pPr/>
-              <a:t>5/26/16</a:t>
+              <a:t>5/31/16</a:t>
             </a:fld>
             <a:endParaRPr lang="en-US" dirty="0"/>
           </a:p>
@@ -3369,7 +3383,7 @@
           <a:p>
             <a:fld id="{9334D819-9F07-4261-B09B-9E467E5D9002}" type="datetimeFigureOut">
               <a:rPr lang="en-US" dirty="0"/>
-              <a:t>5/26/16</a:t>
+              <a:t>5/31/16</a:t>
             </a:fld>
             <a:endParaRPr lang="en-US" dirty="0"/>
           </a:p>
@@ -3754,7 +3768,7 @@
           <a:p>
             <a:fld id="{9334D819-9F07-4261-B09B-9E467E5D9002}" type="datetimeFigureOut">
               <a:rPr lang="en-US" dirty="0"/>
-              <a:t>5/26/16</a:t>
+              <a:t>5/31/16</a:t>
             </a:fld>
             <a:endParaRPr lang="en-US" dirty="0"/>
           </a:p>
@@ -3872,7 +3886,7 @@
           <a:p>
             <a:fld id="{9334D819-9F07-4261-B09B-9E467E5D9002}" type="datetimeFigureOut">
               <a:rPr lang="en-US" dirty="0"/>
-              <a:t>5/26/16</a:t>
+              <a:t>5/31/16</a:t>
             </a:fld>
             <a:endParaRPr lang="en-US" dirty="0"/>
           </a:p>
@@ -3962,7 +3976,7 @@
           <a:p>
             <a:fld id="{9334D819-9F07-4261-B09B-9E467E5D9002}" type="datetimeFigureOut">
               <a:rPr lang="en-US" dirty="0"/>
-              <a:t>5/26/16</a:t>
+              <a:t>5/31/16</a:t>
             </a:fld>
             <a:endParaRPr lang="en-US" dirty="0"/>
           </a:p>
@@ -4720,7 +4734,7 @@
           <a:p>
             <a:fld id="{9334D819-9F07-4261-B09B-9E467E5D9002}" type="datetimeFigureOut">
               <a:rPr lang="en-US" dirty="0"/>
-              <a:t>5/26/16</a:t>
+              <a:t>5/31/16</a:t>
             </a:fld>
             <a:endParaRPr lang="en-US" dirty="0"/>
           </a:p>
@@ -5555,7 +5569,7 @@
           <a:p>
             <a:fld id="{9334D819-9F07-4261-B09B-9E467E5D9002}" type="datetimeFigureOut">
               <a:rPr lang="en-US" dirty="0"/>
-              <a:t>5/26/16</a:t>
+              <a:t>5/31/16</a:t>
             </a:fld>
             <a:endParaRPr lang="en-US" dirty="0"/>
           </a:p>
@@ -5778,7 +5792,7 @@
             <a:fld id="{9334D819-9F07-4261-B09B-9E467E5D9002}" type="datetimeFigureOut">
               <a:rPr lang="en-US" dirty="0"/>
               <a:pPr/>
-              <a:t>5/26/16</a:t>
+              <a:t>5/31/16</a:t>
             </a:fld>
             <a:endParaRPr lang="en-US" dirty="0"/>
           </a:p>
@@ -6831,6 +6845,2225 @@
 </p:sld>
 </file>
 
+<file path=ppt/slides/slide10.xml><?xml version="1.0" encoding="utf-8"?>
+<p:sld xmlns:a="http://schemas.openxmlformats.org/drawingml/2006/main" xmlns:r="http://schemas.openxmlformats.org/officeDocument/2006/relationships" xmlns:p="http://schemas.openxmlformats.org/presentationml/2006/main">
+  <p:cSld>
+    <p:spTree>
+      <p:nvGrpSpPr>
+        <p:cNvPr id="1" name=""/>
+        <p:cNvGrpSpPr/>
+        <p:nvPr/>
+      </p:nvGrpSpPr>
+      <p:grpSpPr>
+        <a:xfrm>
+          <a:off x="0" y="0"/>
+          <a:ext cx="0" cy="0"/>
+          <a:chOff x="0" y="0"/>
+          <a:chExt cx="0" cy="0"/>
+        </a:xfrm>
+      </p:grpSpPr>
+      <p:pic>
+        <p:nvPicPr>
+          <p:cNvPr id="4" name="Content Placeholder 3"/>
+          <p:cNvPicPr>
+            <a:picLocks noGrp="1" noChangeAspect="1"/>
+          </p:cNvPicPr>
+          <p:nvPr>
+            <p:ph idx="4294967295"/>
+          </p:nvPr>
+        </p:nvPicPr>
+        <p:blipFill>
+          <a:blip r:embed="rId2">
+            <a:extLst>
+              <a:ext uri="{28A0092B-C50C-407E-A947-70E740481C1C}">
+                <a14:useLocalDpi xmlns:a14="http://schemas.microsoft.com/office/drawing/2010/main" val="0"/>
+              </a:ext>
+            </a:extLst>
+          </a:blip>
+          <a:stretch>
+            <a:fillRect/>
+          </a:stretch>
+        </p:blipFill>
+        <p:spPr>
+          <a:xfrm>
+            <a:off x="4461658" y="1805354"/>
+            <a:ext cx="7484157" cy="3505199"/>
+          </a:xfrm>
+        </p:spPr>
+      </p:pic>
+      <p:sp>
+        <p:nvSpPr>
+          <p:cNvPr id="5" name="Title 4"/>
+          <p:cNvSpPr>
+            <a:spLocks noGrp="1"/>
+          </p:cNvSpPr>
+          <p:nvPr>
+            <p:ph type="title" idx="4294967295"/>
+          </p:nvPr>
+        </p:nvSpPr>
+        <p:spPr>
+          <a:xfrm>
+            <a:off x="981319" y="422031"/>
+            <a:ext cx="10179050" cy="832338"/>
+          </a:xfrm>
+        </p:spPr>
+        <p:txBody>
+          <a:bodyPr/>
+          <a:lstStyle/>
+          <a:p>
+            <a:pPr algn="ctr"/>
+            <a:r>
+              <a:rPr lang="en-US" b="1" u="sng" dirty="0" smtClean="0"/>
+              <a:t>Your First Impression</a:t>
+            </a:r>
+            <a:endParaRPr lang="en-US" b="1" u="sng" dirty="0"/>
+          </a:p>
+        </p:txBody>
+      </p:sp>
+      <p:sp>
+        <p:nvSpPr>
+          <p:cNvPr id="8" name="TextBox 7"/>
+          <p:cNvSpPr txBox="1"/>
+          <p:nvPr/>
+        </p:nvSpPr>
+        <p:spPr>
+          <a:xfrm>
+            <a:off x="1211137" y="2315252"/>
+            <a:ext cx="2388346" cy="2308324"/>
+          </a:xfrm>
+          <a:prstGeom prst="rect">
+            <a:avLst/>
+          </a:prstGeom>
+          <a:noFill/>
+        </p:spPr>
+        <p:txBody>
+          <a:bodyPr wrap="none" rtlCol="0">
+            <a:spAutoFit/>
+          </a:bodyPr>
+          <a:lstStyle/>
+          <a:p>
+            <a:pPr marL="285750" indent="-285750">
+              <a:buFont typeface="Arial" charset="0"/>
+              <a:buChar char="•"/>
+            </a:pPr>
+            <a:r>
+              <a:rPr lang="en-US" dirty="0" smtClean="0"/>
+              <a:t>Headshot</a:t>
+            </a:r>
+          </a:p>
+          <a:p>
+            <a:pPr marL="285750" indent="-285750">
+              <a:buFont typeface="Arial" charset="0"/>
+              <a:buChar char="•"/>
+            </a:pPr>
+            <a:r>
+              <a:rPr lang="en-US" dirty="0" smtClean="0"/>
+              <a:t>Name</a:t>
+            </a:r>
+          </a:p>
+          <a:p>
+            <a:pPr marL="285750" indent="-285750">
+              <a:buFont typeface="Arial" charset="0"/>
+              <a:buChar char="•"/>
+            </a:pPr>
+            <a:r>
+              <a:rPr lang="en-US" dirty="0" smtClean="0"/>
+              <a:t>Headline</a:t>
+            </a:r>
+          </a:p>
+          <a:p>
+            <a:pPr marL="285750" indent="-285750">
+              <a:buFont typeface="Arial" charset="0"/>
+              <a:buChar char="•"/>
+            </a:pPr>
+            <a:r>
+              <a:rPr lang="en-US" dirty="0" smtClean="0"/>
+              <a:t>City</a:t>
+            </a:r>
+          </a:p>
+          <a:p>
+            <a:pPr marL="285750" indent="-285750">
+              <a:buFont typeface="Arial" charset="0"/>
+              <a:buChar char="•"/>
+            </a:pPr>
+            <a:r>
+              <a:rPr lang="en-US" dirty="0" smtClean="0"/>
+              <a:t>Industry</a:t>
+            </a:r>
+          </a:p>
+          <a:p>
+            <a:pPr marL="285750" indent="-285750">
+              <a:buFont typeface="Arial" charset="0"/>
+              <a:buChar char="•"/>
+            </a:pPr>
+            <a:r>
+              <a:rPr lang="en-US" dirty="0" smtClean="0"/>
+              <a:t>Contact Information</a:t>
+            </a:r>
+          </a:p>
+          <a:p>
+            <a:pPr marL="285750" indent="-285750">
+              <a:buFont typeface="Arial" charset="0"/>
+              <a:buChar char="•"/>
+            </a:pPr>
+            <a:r>
+              <a:rPr lang="en-US" dirty="0" smtClean="0"/>
+              <a:t>Personal URL</a:t>
+            </a:r>
+          </a:p>
+          <a:p>
+            <a:pPr marL="285750" indent="-285750">
+              <a:buFont typeface="Arial" charset="0"/>
+              <a:buChar char="•"/>
+            </a:pPr>
+            <a:endParaRPr lang="en-US" dirty="0"/>
+          </a:p>
+        </p:txBody>
+      </p:sp>
+    </p:spTree>
+    <p:extLst>
+      <p:ext uri="{BB962C8B-B14F-4D97-AF65-F5344CB8AC3E}">
+        <p14:creationId xmlns:p14="http://schemas.microsoft.com/office/powerpoint/2010/main" val="1394975051"/>
+      </p:ext>
+    </p:extLst>
+  </p:cSld>
+  <p:clrMapOvr>
+    <a:masterClrMapping/>
+  </p:clrMapOvr>
+</p:sld>
+</file>
+
+<file path=ppt/slides/slide11.xml><?xml version="1.0" encoding="utf-8"?>
+<p:sld xmlns:a="http://schemas.openxmlformats.org/drawingml/2006/main" xmlns:r="http://schemas.openxmlformats.org/officeDocument/2006/relationships" xmlns:p="http://schemas.openxmlformats.org/presentationml/2006/main">
+  <p:cSld>
+    <p:spTree>
+      <p:nvGrpSpPr>
+        <p:cNvPr id="1" name=""/>
+        <p:cNvGrpSpPr/>
+        <p:nvPr/>
+      </p:nvGrpSpPr>
+      <p:grpSpPr>
+        <a:xfrm>
+          <a:off x="0" y="0"/>
+          <a:ext cx="0" cy="0"/>
+          <a:chOff x="0" y="0"/>
+          <a:chExt cx="0" cy="0"/>
+        </a:xfrm>
+      </p:grpSpPr>
+      <p:sp>
+        <p:nvSpPr>
+          <p:cNvPr id="2" name="Text Placeholder 1"/>
+          <p:cNvSpPr>
+            <a:spLocks noGrp="1"/>
+          </p:cNvSpPr>
+          <p:nvPr>
+            <p:ph type="body" idx="1"/>
+          </p:nvPr>
+        </p:nvSpPr>
+        <p:spPr>
+          <a:xfrm>
+            <a:off x="1257300" y="101203"/>
+            <a:ext cx="4800600" cy="632529"/>
+          </a:xfrm>
+        </p:spPr>
+        <p:txBody>
+          <a:bodyPr/>
+          <a:lstStyle/>
+          <a:p>
+            <a:r>
+              <a:rPr lang="en-US" dirty="0" smtClean="0"/>
+              <a:t>Your Headshot</a:t>
+            </a:r>
+            <a:endParaRPr lang="en-US" dirty="0"/>
+          </a:p>
+        </p:txBody>
+      </p:sp>
+      <p:sp>
+        <p:nvSpPr>
+          <p:cNvPr id="5" name="Content Placeholder 4"/>
+          <p:cNvSpPr>
+            <a:spLocks noGrp="1"/>
+          </p:cNvSpPr>
+          <p:nvPr>
+            <p:ph sz="half" idx="2"/>
+          </p:nvPr>
+        </p:nvSpPr>
+        <p:spPr>
+          <a:xfrm>
+            <a:off x="1257300" y="1017698"/>
+            <a:ext cx="4800600" cy="2996398"/>
+          </a:xfrm>
+        </p:spPr>
+        <p:txBody>
+          <a:bodyPr>
+            <a:normAutofit fontScale="85000" lnSpcReduction="10000"/>
+          </a:bodyPr>
+          <a:lstStyle/>
+          <a:p>
+            <a:r>
+              <a:rPr lang="en-US" dirty="0" smtClean="0"/>
+              <a:t>This is the first thing people will see when visiting your profile</a:t>
+            </a:r>
+          </a:p>
+          <a:p>
+            <a:r>
+              <a:rPr lang="en-US" dirty="0" smtClean="0"/>
+              <a:t>Get an image that just shows your head and shoulders</a:t>
+            </a:r>
+          </a:p>
+          <a:p>
+            <a:r>
+              <a:rPr lang="en-US" dirty="0" smtClean="0"/>
+              <a:t>If it’s a more creative image feel free to use that</a:t>
+            </a:r>
+          </a:p>
+          <a:p>
+            <a:r>
+              <a:rPr lang="en-US" dirty="0" smtClean="0"/>
+              <a:t>Make sure to wear nice clothing</a:t>
+            </a:r>
+          </a:p>
+          <a:p>
+            <a:pPr lvl="1"/>
+            <a:r>
+              <a:rPr lang="en-US" dirty="0" smtClean="0"/>
+              <a:t>Clean clothing</a:t>
+            </a:r>
+          </a:p>
+          <a:p>
+            <a:pPr lvl="1"/>
+            <a:r>
+              <a:rPr lang="en-US" dirty="0" smtClean="0"/>
+              <a:t>Ironed clothing</a:t>
+            </a:r>
+          </a:p>
+          <a:p>
+            <a:pPr lvl="1"/>
+            <a:r>
+              <a:rPr lang="en-US" dirty="0" smtClean="0"/>
+              <a:t>No deep </a:t>
+            </a:r>
+            <a:r>
+              <a:rPr lang="en-US" dirty="0" err="1" smtClean="0"/>
+              <a:t>v-necks</a:t>
+            </a:r>
+            <a:endParaRPr lang="en-US" dirty="0" smtClean="0"/>
+          </a:p>
+        </p:txBody>
+      </p:sp>
+      <p:sp>
+        <p:nvSpPr>
+          <p:cNvPr id="3" name="Text Placeholder 2"/>
+          <p:cNvSpPr>
+            <a:spLocks noGrp="1"/>
+          </p:cNvSpPr>
+          <p:nvPr>
+            <p:ph type="body" sz="quarter" idx="3"/>
+          </p:nvPr>
+        </p:nvSpPr>
+        <p:spPr>
+          <a:xfrm>
+            <a:off x="6633864" y="101203"/>
+            <a:ext cx="4800600" cy="632529"/>
+          </a:xfrm>
+        </p:spPr>
+        <p:txBody>
+          <a:bodyPr/>
+          <a:lstStyle/>
+          <a:p>
+            <a:r>
+              <a:rPr lang="en-US" dirty="0" smtClean="0"/>
+              <a:t>Your headline</a:t>
+            </a:r>
+            <a:endParaRPr lang="en-US" dirty="0"/>
+          </a:p>
+        </p:txBody>
+      </p:sp>
+      <p:sp>
+        <p:nvSpPr>
+          <p:cNvPr id="6" name="Content Placeholder 5"/>
+          <p:cNvSpPr>
+            <a:spLocks noGrp="1"/>
+          </p:cNvSpPr>
+          <p:nvPr>
+            <p:ph sz="quarter" idx="4"/>
+          </p:nvPr>
+        </p:nvSpPr>
+        <p:spPr>
+          <a:xfrm>
+            <a:off x="6633864" y="1017698"/>
+            <a:ext cx="4800600" cy="2996398"/>
+          </a:xfrm>
+        </p:spPr>
+        <p:txBody>
+          <a:bodyPr/>
+          <a:lstStyle/>
+          <a:p>
+            <a:r>
+              <a:rPr lang="en-US" dirty="0" smtClean="0"/>
+              <a:t>Be Creative</a:t>
+            </a:r>
+          </a:p>
+          <a:p>
+            <a:r>
+              <a:rPr lang="en-US" dirty="0" smtClean="0"/>
+              <a:t>Do NOT write “Student” </a:t>
+            </a:r>
+          </a:p>
+          <a:p>
+            <a:r>
+              <a:rPr lang="en-US" dirty="0" smtClean="0"/>
+              <a:t>Show what you’re interested in</a:t>
+            </a:r>
+          </a:p>
+          <a:p>
+            <a:r>
+              <a:rPr lang="en-US" dirty="0" smtClean="0"/>
+              <a:t>This should definitely include something about programming</a:t>
+            </a:r>
+          </a:p>
+          <a:p>
+            <a:r>
+              <a:rPr lang="en-US" dirty="0" smtClean="0"/>
+              <a:t>Can also including something not about programming</a:t>
+            </a:r>
+            <a:endParaRPr lang="en-US" dirty="0"/>
+          </a:p>
+        </p:txBody>
+      </p:sp>
+    </p:spTree>
+    <p:extLst>
+      <p:ext uri="{BB962C8B-B14F-4D97-AF65-F5344CB8AC3E}">
+        <p14:creationId xmlns:p14="http://schemas.microsoft.com/office/powerpoint/2010/main" val="514598276"/>
+      </p:ext>
+    </p:extLst>
+  </p:cSld>
+  <p:clrMapOvr>
+    <a:masterClrMapping/>
+  </p:clrMapOvr>
+</p:sld>
+</file>
+
+<file path=ppt/slides/slide12.xml><?xml version="1.0" encoding="utf-8"?>
+<p:sld xmlns:a="http://schemas.openxmlformats.org/drawingml/2006/main" xmlns:r="http://schemas.openxmlformats.org/officeDocument/2006/relationships" xmlns:p="http://schemas.openxmlformats.org/presentationml/2006/main">
+  <p:cSld>
+    <p:spTree>
+      <p:nvGrpSpPr>
+        <p:cNvPr id="1" name=""/>
+        <p:cNvGrpSpPr/>
+        <p:nvPr/>
+      </p:nvGrpSpPr>
+      <p:grpSpPr>
+        <a:xfrm>
+          <a:off x="0" y="0"/>
+          <a:ext cx="0" cy="0"/>
+          <a:chOff x="0" y="0"/>
+          <a:chExt cx="0" cy="0"/>
+        </a:xfrm>
+      </p:grpSpPr>
+      <p:sp>
+        <p:nvSpPr>
+          <p:cNvPr id="5" name="Title 4"/>
+          <p:cNvSpPr>
+            <a:spLocks noGrp="1"/>
+          </p:cNvSpPr>
+          <p:nvPr>
+            <p:ph type="title" idx="4294967295"/>
+          </p:nvPr>
+        </p:nvSpPr>
+        <p:spPr>
+          <a:xfrm>
+            <a:off x="981319" y="422031"/>
+            <a:ext cx="10179050" cy="832338"/>
+          </a:xfrm>
+        </p:spPr>
+        <p:txBody>
+          <a:bodyPr/>
+          <a:lstStyle/>
+          <a:p>
+            <a:pPr algn="ctr"/>
+            <a:r>
+              <a:rPr lang="en-US" b="1" dirty="0" smtClean="0"/>
+              <a:t>City and Industry</a:t>
+            </a:r>
+            <a:endParaRPr lang="en-US" b="1" dirty="0"/>
+          </a:p>
+        </p:txBody>
+      </p:sp>
+      <p:sp>
+        <p:nvSpPr>
+          <p:cNvPr id="8" name="TextBox 7"/>
+          <p:cNvSpPr txBox="1"/>
+          <p:nvPr/>
+        </p:nvSpPr>
+        <p:spPr>
+          <a:xfrm>
+            <a:off x="1211137" y="1647037"/>
+            <a:ext cx="9949232" cy="2585323"/>
+          </a:xfrm>
+          <a:prstGeom prst="rect">
+            <a:avLst/>
+          </a:prstGeom>
+          <a:noFill/>
+        </p:spPr>
+        <p:txBody>
+          <a:bodyPr wrap="square" rtlCol="0">
+            <a:spAutoFit/>
+          </a:bodyPr>
+          <a:lstStyle/>
+          <a:p>
+            <a:pPr marL="285750" indent="-285750">
+              <a:buFont typeface="Arial" charset="0"/>
+              <a:buChar char="•"/>
+            </a:pPr>
+            <a:r>
+              <a:rPr lang="en-US" dirty="0" smtClean="0"/>
+              <a:t>Where are you looking for a job?</a:t>
+            </a:r>
+          </a:p>
+          <a:p>
+            <a:pPr marL="285750" indent="-285750">
+              <a:buFont typeface="Arial" charset="0"/>
+              <a:buChar char="•"/>
+            </a:pPr>
+            <a:endParaRPr lang="en-US" dirty="0"/>
+          </a:p>
+          <a:p>
+            <a:pPr marL="285750" indent="-285750">
+              <a:buFont typeface="Arial" charset="0"/>
+              <a:buChar char="•"/>
+            </a:pPr>
+            <a:r>
+              <a:rPr lang="en-US" dirty="0" smtClean="0"/>
+              <a:t>Put the city or state where you want to get a job</a:t>
+            </a:r>
+          </a:p>
+          <a:p>
+            <a:pPr marL="285750" indent="-285750">
+              <a:buFont typeface="Arial" charset="0"/>
+              <a:buChar char="•"/>
+            </a:pPr>
+            <a:endParaRPr lang="en-US" dirty="0" smtClean="0"/>
+          </a:p>
+          <a:p>
+            <a:pPr marL="285750" indent="-285750">
+              <a:buFont typeface="Arial" charset="0"/>
+              <a:buChar char="•"/>
+            </a:pPr>
+            <a:r>
+              <a:rPr lang="en-US" dirty="0" smtClean="0"/>
+              <a:t>If you are open to moving around then you can leave it blank</a:t>
+            </a:r>
+          </a:p>
+          <a:p>
+            <a:pPr marL="285750" indent="-285750">
+              <a:buFont typeface="Arial" charset="0"/>
+              <a:buChar char="•"/>
+            </a:pPr>
+            <a:endParaRPr lang="en-US" dirty="0" smtClean="0"/>
+          </a:p>
+          <a:p>
+            <a:pPr marL="285750" indent="-285750">
+              <a:buFont typeface="Arial" charset="0"/>
+              <a:buChar char="•"/>
+            </a:pPr>
+            <a:r>
+              <a:rPr lang="en-US" dirty="0" smtClean="0"/>
+              <a:t>What industry are you looking for?</a:t>
+            </a:r>
+          </a:p>
+          <a:p>
+            <a:pPr marL="285750" indent="-285750">
+              <a:buFont typeface="Arial" charset="0"/>
+              <a:buChar char="•"/>
+            </a:pPr>
+            <a:endParaRPr lang="en-US" dirty="0" smtClean="0"/>
+          </a:p>
+          <a:p>
+            <a:pPr marL="285750" indent="-285750">
+              <a:buFont typeface="Arial" charset="0"/>
+              <a:buChar char="•"/>
+            </a:pPr>
+            <a:r>
+              <a:rPr lang="en-US" dirty="0" smtClean="0"/>
+              <a:t>Include all industries that are related to your field</a:t>
+            </a:r>
+            <a:endParaRPr lang="en-US" dirty="0"/>
+          </a:p>
+        </p:txBody>
+      </p:sp>
+    </p:spTree>
+    <p:extLst>
+      <p:ext uri="{BB962C8B-B14F-4D97-AF65-F5344CB8AC3E}">
+        <p14:creationId xmlns:p14="http://schemas.microsoft.com/office/powerpoint/2010/main" val="1271204827"/>
+      </p:ext>
+    </p:extLst>
+  </p:cSld>
+  <p:clrMapOvr>
+    <a:masterClrMapping/>
+  </p:clrMapOvr>
+</p:sld>
+</file>
+
+<file path=ppt/slides/slide13.xml><?xml version="1.0" encoding="utf-8"?>
+<p:sld xmlns:a="http://schemas.openxmlformats.org/drawingml/2006/main" xmlns:r="http://schemas.openxmlformats.org/officeDocument/2006/relationships" xmlns:p="http://schemas.openxmlformats.org/presentationml/2006/main">
+  <p:cSld>
+    <p:spTree>
+      <p:nvGrpSpPr>
+        <p:cNvPr id="1" name=""/>
+        <p:cNvGrpSpPr/>
+        <p:nvPr/>
+      </p:nvGrpSpPr>
+      <p:grpSpPr>
+        <a:xfrm>
+          <a:off x="0" y="0"/>
+          <a:ext cx="0" cy="0"/>
+          <a:chOff x="0" y="0"/>
+          <a:chExt cx="0" cy="0"/>
+        </a:xfrm>
+      </p:grpSpPr>
+      <p:sp>
+        <p:nvSpPr>
+          <p:cNvPr id="2" name="Text Placeholder 1"/>
+          <p:cNvSpPr>
+            <a:spLocks noGrp="1"/>
+          </p:cNvSpPr>
+          <p:nvPr>
+            <p:ph type="body" idx="1"/>
+          </p:nvPr>
+        </p:nvSpPr>
+        <p:spPr>
+          <a:xfrm>
+            <a:off x="1257300" y="101203"/>
+            <a:ext cx="4800600" cy="462469"/>
+          </a:xfrm>
+        </p:spPr>
+        <p:txBody>
+          <a:bodyPr/>
+          <a:lstStyle/>
+          <a:p>
+            <a:r>
+              <a:rPr lang="en-US" dirty="0" smtClean="0"/>
+              <a:t>Your Personal URL</a:t>
+            </a:r>
+            <a:endParaRPr lang="en-US" dirty="0"/>
+          </a:p>
+        </p:txBody>
+      </p:sp>
+      <p:sp>
+        <p:nvSpPr>
+          <p:cNvPr id="5" name="Content Placeholder 4"/>
+          <p:cNvSpPr>
+            <a:spLocks noGrp="1"/>
+          </p:cNvSpPr>
+          <p:nvPr>
+            <p:ph sz="half" idx="2"/>
+          </p:nvPr>
+        </p:nvSpPr>
+        <p:spPr>
+          <a:xfrm>
+            <a:off x="1257300" y="733732"/>
+            <a:ext cx="4800600" cy="2996398"/>
+          </a:xfrm>
+        </p:spPr>
+        <p:txBody>
+          <a:bodyPr>
+            <a:normAutofit/>
+          </a:bodyPr>
+          <a:lstStyle/>
+          <a:p>
+            <a:r>
+              <a:rPr lang="en-US" dirty="0" smtClean="0"/>
+              <a:t>SET YOUR URL!!!</a:t>
+            </a:r>
+          </a:p>
+          <a:p>
+            <a:r>
+              <a:rPr lang="en-US" dirty="0" smtClean="0"/>
+              <a:t>Do not use the default one LinkedIn URL</a:t>
+            </a:r>
+          </a:p>
+          <a:p>
+            <a:r>
+              <a:rPr lang="en-US" dirty="0" smtClean="0"/>
+              <a:t>Make it as close to your name as possible</a:t>
+            </a:r>
+          </a:p>
+          <a:p>
+            <a:r>
+              <a:rPr lang="en-US" dirty="0" smtClean="0"/>
+              <a:t>This will be the URL you share to employers and recruiters</a:t>
+            </a:r>
+          </a:p>
+          <a:p>
+            <a:endParaRPr lang="en-US" dirty="0" smtClean="0"/>
+          </a:p>
+        </p:txBody>
+      </p:sp>
+      <p:sp>
+        <p:nvSpPr>
+          <p:cNvPr id="3" name="Text Placeholder 2"/>
+          <p:cNvSpPr>
+            <a:spLocks noGrp="1"/>
+          </p:cNvSpPr>
+          <p:nvPr>
+            <p:ph type="body" sz="quarter" idx="3"/>
+          </p:nvPr>
+        </p:nvSpPr>
+        <p:spPr>
+          <a:xfrm>
+            <a:off x="6633864" y="101204"/>
+            <a:ext cx="4800600" cy="462468"/>
+          </a:xfrm>
+        </p:spPr>
+        <p:txBody>
+          <a:bodyPr/>
+          <a:lstStyle/>
+          <a:p>
+            <a:r>
+              <a:rPr lang="en-US" dirty="0" smtClean="0"/>
+              <a:t>Your Contact Information</a:t>
+            </a:r>
+            <a:endParaRPr lang="en-US" dirty="0"/>
+          </a:p>
+        </p:txBody>
+      </p:sp>
+      <p:pic>
+        <p:nvPicPr>
+          <p:cNvPr id="4" name="Content Placeholder 3"/>
+          <p:cNvPicPr>
+            <a:picLocks noGrp="1" noChangeAspect="1"/>
+          </p:cNvPicPr>
+          <p:nvPr>
+            <p:ph sz="quarter" idx="4"/>
+          </p:nvPr>
+        </p:nvPicPr>
+        <p:blipFill>
+          <a:blip r:embed="rId2">
+            <a:extLst>
+              <a:ext uri="{28A0092B-C50C-407E-A947-70E740481C1C}">
+                <a14:useLocalDpi xmlns:a14="http://schemas.microsoft.com/office/drawing/2010/main" val="0"/>
+              </a:ext>
+            </a:extLst>
+          </a:blip>
+          <a:stretch>
+            <a:fillRect/>
+          </a:stretch>
+        </p:blipFill>
+        <p:spPr>
+          <a:xfrm>
+            <a:off x="1257301" y="3470192"/>
+            <a:ext cx="6270842" cy="3387808"/>
+          </a:xfrm>
+        </p:spPr>
+      </p:pic>
+      <p:sp>
+        <p:nvSpPr>
+          <p:cNvPr id="8" name="Content Placeholder 4"/>
+          <p:cNvSpPr txBox="1">
+            <a:spLocks/>
+          </p:cNvSpPr>
+          <p:nvPr/>
+        </p:nvSpPr>
+        <p:spPr>
+          <a:xfrm>
+            <a:off x="6633864" y="733731"/>
+            <a:ext cx="4800600" cy="3462487"/>
+          </a:xfrm>
+          <a:prstGeom prst="rect">
+            <a:avLst/>
+          </a:prstGeom>
+        </p:spPr>
+        <p:txBody>
+          <a:bodyPr vert="horz" lIns="91440" tIns="45720" rIns="91440" bIns="45720" rtlCol="0">
+            <a:normAutofit/>
+          </a:bodyPr>
+          <a:lstStyle>
+            <a:lvl1pPr marL="228600" indent="-228600" algn="l" defTabSz="914400" rtl="0" eaLnBrk="1" latinLnBrk="0" hangingPunct="1">
+              <a:lnSpc>
+                <a:spcPct val="110000"/>
+              </a:lnSpc>
+              <a:spcBef>
+                <a:spcPts val="700"/>
+              </a:spcBef>
+              <a:buClr>
+                <a:schemeClr val="tx2"/>
+              </a:buClr>
+              <a:buFont typeface="Arial" panose="020B0604020202020204" pitchFamily="34" charset="0"/>
+              <a:buChar char="•"/>
+              <a:defRPr sz="2000" kern="1200">
+                <a:solidFill>
+                  <a:schemeClr val="tx1">
+                    <a:lumMod val="65000"/>
+                    <a:lumOff val="35000"/>
+                  </a:schemeClr>
+                </a:solidFill>
+                <a:latin typeface="+mn-lt"/>
+                <a:ea typeface="+mn-ea"/>
+                <a:cs typeface="+mn-cs"/>
+              </a:defRPr>
+            </a:lvl1pPr>
+            <a:lvl2pPr marL="685800" indent="-228600" algn="l" defTabSz="914400" rtl="0" eaLnBrk="1" latinLnBrk="0" hangingPunct="1">
+              <a:lnSpc>
+                <a:spcPct val="110000"/>
+              </a:lnSpc>
+              <a:spcBef>
+                <a:spcPts val="700"/>
+              </a:spcBef>
+              <a:buClr>
+                <a:schemeClr val="tx2"/>
+              </a:buClr>
+              <a:buFont typeface="Gill Sans MT" panose="020B0502020104020203" pitchFamily="34" charset="0"/>
+              <a:buChar char="–"/>
+              <a:defRPr sz="1800" kern="1200">
+                <a:solidFill>
+                  <a:schemeClr val="tx1">
+                    <a:lumMod val="65000"/>
+                    <a:lumOff val="35000"/>
+                  </a:schemeClr>
+                </a:solidFill>
+                <a:latin typeface="+mn-lt"/>
+                <a:ea typeface="+mn-ea"/>
+                <a:cs typeface="+mn-cs"/>
+              </a:defRPr>
+            </a:lvl2pPr>
+            <a:lvl3pPr marL="1143000" indent="-228600" algn="l" defTabSz="914400" rtl="0" eaLnBrk="1" latinLnBrk="0" hangingPunct="1">
+              <a:lnSpc>
+                <a:spcPct val="110000"/>
+              </a:lnSpc>
+              <a:spcBef>
+                <a:spcPts val="700"/>
+              </a:spcBef>
+              <a:buClr>
+                <a:schemeClr val="tx2"/>
+              </a:buClr>
+              <a:buFont typeface="Arial" panose="020B0604020202020204" pitchFamily="34" charset="0"/>
+              <a:buChar char="•"/>
+              <a:defRPr sz="1600" kern="1200">
+                <a:solidFill>
+                  <a:schemeClr val="tx1">
+                    <a:lumMod val="65000"/>
+                    <a:lumOff val="35000"/>
+                  </a:schemeClr>
+                </a:solidFill>
+                <a:latin typeface="+mn-lt"/>
+                <a:ea typeface="+mn-ea"/>
+                <a:cs typeface="+mn-cs"/>
+              </a:defRPr>
+            </a:lvl3pPr>
+            <a:lvl4pPr marL="1600200" indent="-228600" algn="l" defTabSz="914400" rtl="0" eaLnBrk="1" latinLnBrk="0" hangingPunct="1">
+              <a:lnSpc>
+                <a:spcPct val="110000"/>
+              </a:lnSpc>
+              <a:spcBef>
+                <a:spcPts val="700"/>
+              </a:spcBef>
+              <a:buClr>
+                <a:schemeClr val="tx2"/>
+              </a:buClr>
+              <a:buFont typeface="Gill Sans MT" panose="020B0502020104020203" pitchFamily="34" charset="0"/>
+              <a:buChar char="–"/>
+              <a:defRPr sz="1400" kern="1200">
+                <a:solidFill>
+                  <a:schemeClr val="tx1">
+                    <a:lumMod val="65000"/>
+                    <a:lumOff val="35000"/>
+                  </a:schemeClr>
+                </a:solidFill>
+                <a:latin typeface="+mn-lt"/>
+                <a:ea typeface="+mn-ea"/>
+                <a:cs typeface="+mn-cs"/>
+              </a:defRPr>
+            </a:lvl4pPr>
+            <a:lvl5pPr marL="2057400" indent="-228600" algn="l" defTabSz="914400" rtl="0" eaLnBrk="1" latinLnBrk="0" hangingPunct="1">
+              <a:lnSpc>
+                <a:spcPct val="110000"/>
+              </a:lnSpc>
+              <a:spcBef>
+                <a:spcPts val="700"/>
+              </a:spcBef>
+              <a:buClr>
+                <a:schemeClr val="tx2"/>
+              </a:buClr>
+              <a:buFont typeface="Arial" panose="020B0604020202020204" pitchFamily="34" charset="0"/>
+              <a:buChar char="•"/>
+              <a:defRPr sz="1400" kern="1200">
+                <a:solidFill>
+                  <a:schemeClr val="tx1">
+                    <a:lumMod val="65000"/>
+                    <a:lumOff val="35000"/>
+                  </a:schemeClr>
+                </a:solidFill>
+                <a:latin typeface="+mn-lt"/>
+                <a:ea typeface="+mn-ea"/>
+                <a:cs typeface="+mn-cs"/>
+              </a:defRPr>
+            </a:lvl5pPr>
+            <a:lvl6pPr marL="2514600" indent="-228600" algn="l" defTabSz="914400" rtl="0" eaLnBrk="1" latinLnBrk="0" hangingPunct="1">
+              <a:lnSpc>
+                <a:spcPct val="110000"/>
+              </a:lnSpc>
+              <a:spcBef>
+                <a:spcPts val="700"/>
+              </a:spcBef>
+              <a:buClr>
+                <a:schemeClr val="tx2"/>
+              </a:buClr>
+              <a:buFont typeface="Gill Sans MT" panose="020B0502020104020203" pitchFamily="34" charset="0"/>
+              <a:buChar char="–"/>
+              <a:defRPr sz="1400" kern="1200">
+                <a:solidFill>
+                  <a:schemeClr val="tx1">
+                    <a:lumMod val="65000"/>
+                    <a:lumOff val="35000"/>
+                  </a:schemeClr>
+                </a:solidFill>
+                <a:latin typeface="+mn-lt"/>
+                <a:ea typeface="+mn-ea"/>
+                <a:cs typeface="+mn-cs"/>
+              </a:defRPr>
+            </a:lvl6pPr>
+            <a:lvl7pPr marL="2971800" indent="-228600" algn="l" defTabSz="914400" rtl="0" eaLnBrk="1" latinLnBrk="0" hangingPunct="1">
+              <a:lnSpc>
+                <a:spcPct val="110000"/>
+              </a:lnSpc>
+              <a:spcBef>
+                <a:spcPts val="700"/>
+              </a:spcBef>
+              <a:buClr>
+                <a:schemeClr val="tx2"/>
+              </a:buClr>
+              <a:buFont typeface="Arial" panose="020B0604020202020204" pitchFamily="34" charset="0"/>
+              <a:buChar char="•"/>
+              <a:defRPr sz="1400" kern="1200">
+                <a:solidFill>
+                  <a:schemeClr val="tx1">
+                    <a:lumMod val="65000"/>
+                    <a:lumOff val="35000"/>
+                  </a:schemeClr>
+                </a:solidFill>
+                <a:latin typeface="+mn-lt"/>
+                <a:ea typeface="+mn-ea"/>
+                <a:cs typeface="+mn-cs"/>
+              </a:defRPr>
+            </a:lvl7pPr>
+            <a:lvl8pPr marL="3429000" indent="-228600" algn="l" defTabSz="914400" rtl="0" eaLnBrk="1" latinLnBrk="0" hangingPunct="1">
+              <a:lnSpc>
+                <a:spcPct val="110000"/>
+              </a:lnSpc>
+              <a:spcBef>
+                <a:spcPts val="700"/>
+              </a:spcBef>
+              <a:buClr>
+                <a:schemeClr val="tx2"/>
+              </a:buClr>
+              <a:buFont typeface="Gill Sans MT" panose="020B0502020104020203" pitchFamily="34" charset="0"/>
+              <a:buChar char="–"/>
+              <a:defRPr sz="1400" kern="1200" baseline="0">
+                <a:solidFill>
+                  <a:schemeClr val="tx1">
+                    <a:lumMod val="65000"/>
+                    <a:lumOff val="35000"/>
+                  </a:schemeClr>
+                </a:solidFill>
+                <a:latin typeface="+mn-lt"/>
+                <a:ea typeface="+mn-ea"/>
+                <a:cs typeface="+mn-cs"/>
+              </a:defRPr>
+            </a:lvl8pPr>
+            <a:lvl9pPr marL="3886200" indent="-228600" algn="l" defTabSz="914400" rtl="0" eaLnBrk="1" latinLnBrk="0" hangingPunct="1">
+              <a:lnSpc>
+                <a:spcPct val="110000"/>
+              </a:lnSpc>
+              <a:spcBef>
+                <a:spcPts val="700"/>
+              </a:spcBef>
+              <a:buClr>
+                <a:schemeClr val="tx2"/>
+              </a:buClr>
+              <a:buFont typeface="Arial" panose="020B0604020202020204" pitchFamily="34" charset="0"/>
+              <a:buChar char="•"/>
+              <a:defRPr sz="1400" kern="1200" baseline="0">
+                <a:solidFill>
+                  <a:schemeClr val="tx1">
+                    <a:lumMod val="65000"/>
+                    <a:lumOff val="35000"/>
+                  </a:schemeClr>
+                </a:solidFill>
+                <a:latin typeface="+mn-lt"/>
+                <a:ea typeface="+mn-ea"/>
+                <a:cs typeface="+mn-cs"/>
+              </a:defRPr>
+            </a:lvl9pPr>
+          </a:lstStyle>
+          <a:p>
+            <a:r>
+              <a:rPr lang="en-US" dirty="0" smtClean="0"/>
+              <a:t>Use a professional email address. </a:t>
+            </a:r>
+          </a:p>
+          <a:p>
+            <a:r>
+              <a:rPr lang="en-US" dirty="0" smtClean="0"/>
+              <a:t>Make your email public</a:t>
+            </a:r>
+          </a:p>
+          <a:p>
+            <a:r>
+              <a:rPr lang="en-US" dirty="0" smtClean="0"/>
+              <a:t>Put up your </a:t>
+            </a:r>
+            <a:r>
+              <a:rPr lang="en-US" dirty="0" err="1" smtClean="0"/>
+              <a:t>Github</a:t>
+            </a:r>
+            <a:r>
+              <a:rPr lang="en-US" dirty="0" smtClean="0"/>
+              <a:t> link</a:t>
+            </a:r>
+          </a:p>
+          <a:p>
+            <a:r>
+              <a:rPr lang="en-US" dirty="0" smtClean="0"/>
+              <a:t>Any other sites, such as a personal portfolio include</a:t>
+            </a:r>
+          </a:p>
+          <a:p>
+            <a:r>
+              <a:rPr lang="en-US" dirty="0" smtClean="0"/>
+              <a:t>Do NOT use any social media accounts unless they are relevant to work, or the industry you hope to join</a:t>
+            </a:r>
+            <a:endParaRPr lang="en-US" dirty="0" smtClean="0"/>
+          </a:p>
+        </p:txBody>
+      </p:sp>
+    </p:spTree>
+    <p:extLst>
+      <p:ext uri="{BB962C8B-B14F-4D97-AF65-F5344CB8AC3E}">
+        <p14:creationId xmlns:p14="http://schemas.microsoft.com/office/powerpoint/2010/main" val="1892397967"/>
+      </p:ext>
+    </p:extLst>
+  </p:cSld>
+  <p:clrMapOvr>
+    <a:masterClrMapping/>
+  </p:clrMapOvr>
+</p:sld>
+</file>
+
+<file path=ppt/slides/slide14.xml><?xml version="1.0" encoding="utf-8"?>
+<p:sld xmlns:a="http://schemas.openxmlformats.org/drawingml/2006/main" xmlns:r="http://schemas.openxmlformats.org/officeDocument/2006/relationships" xmlns:p="http://schemas.openxmlformats.org/presentationml/2006/main">
+  <p:cSld>
+    <p:spTree>
+      <p:nvGrpSpPr>
+        <p:cNvPr id="1" name=""/>
+        <p:cNvGrpSpPr/>
+        <p:nvPr/>
+      </p:nvGrpSpPr>
+      <p:grpSpPr>
+        <a:xfrm>
+          <a:off x="0" y="0"/>
+          <a:ext cx="0" cy="0"/>
+          <a:chOff x="0" y="0"/>
+          <a:chExt cx="0" cy="0"/>
+        </a:xfrm>
+      </p:grpSpPr>
+      <p:sp>
+        <p:nvSpPr>
+          <p:cNvPr id="2" name="Title 1"/>
+          <p:cNvSpPr>
+            <a:spLocks noGrp="1"/>
+          </p:cNvSpPr>
+          <p:nvPr>
+            <p:ph type="title"/>
+          </p:nvPr>
+        </p:nvSpPr>
+        <p:spPr/>
+        <p:txBody>
+          <a:bodyPr/>
+          <a:lstStyle/>
+          <a:p>
+            <a:pPr algn="ctr"/>
+            <a:r>
+              <a:rPr lang="en-US" dirty="0" smtClean="0"/>
+              <a:t>Your Summary</a:t>
+            </a:r>
+            <a:endParaRPr lang="en-US" dirty="0"/>
+          </a:p>
+        </p:txBody>
+      </p:sp>
+      <p:sp>
+        <p:nvSpPr>
+          <p:cNvPr id="3" name="Content Placeholder 2"/>
+          <p:cNvSpPr>
+            <a:spLocks noGrp="1"/>
+          </p:cNvSpPr>
+          <p:nvPr>
+            <p:ph idx="1"/>
+          </p:nvPr>
+        </p:nvSpPr>
+        <p:spPr/>
+        <p:txBody>
+          <a:bodyPr/>
+          <a:lstStyle/>
+          <a:p>
+            <a:r>
+              <a:rPr lang="en-US" dirty="0" smtClean="0"/>
+              <a:t>Who are you?</a:t>
+            </a:r>
+          </a:p>
+          <a:p>
+            <a:r>
+              <a:rPr lang="en-US" dirty="0" smtClean="0"/>
+              <a:t>What did you use to do?</a:t>
+            </a:r>
+            <a:endParaRPr lang="en-US" dirty="0" smtClean="0"/>
+          </a:p>
+          <a:p>
+            <a:r>
+              <a:rPr lang="en-US" dirty="0" smtClean="0"/>
+              <a:t>What are you currently doing?</a:t>
+            </a:r>
+          </a:p>
+          <a:p>
+            <a:r>
+              <a:rPr lang="en-US" dirty="0" smtClean="0"/>
+              <a:t>Where do you want to go? What are you looking for?</a:t>
+            </a:r>
+          </a:p>
+          <a:p>
+            <a:r>
+              <a:rPr lang="en-US" dirty="0" smtClean="0"/>
+              <a:t>Write this in first person</a:t>
+            </a:r>
+          </a:p>
+          <a:p>
+            <a:r>
+              <a:rPr lang="en-US" dirty="0" smtClean="0"/>
+              <a:t>Keep it short</a:t>
+            </a:r>
+          </a:p>
+          <a:p>
+            <a:r>
+              <a:rPr lang="en-US" dirty="0" smtClean="0"/>
+              <a:t>Emphasize important aspects of your experience</a:t>
+            </a:r>
+          </a:p>
+          <a:p>
+            <a:endParaRPr lang="en-US" dirty="0" smtClean="0"/>
+          </a:p>
+          <a:p>
+            <a:endParaRPr lang="en-US" dirty="0"/>
+          </a:p>
+        </p:txBody>
+      </p:sp>
+    </p:spTree>
+    <p:extLst>
+      <p:ext uri="{BB962C8B-B14F-4D97-AF65-F5344CB8AC3E}">
+        <p14:creationId xmlns:p14="http://schemas.microsoft.com/office/powerpoint/2010/main" val="975754196"/>
+      </p:ext>
+    </p:extLst>
+  </p:cSld>
+  <p:clrMapOvr>
+    <a:masterClrMapping/>
+  </p:clrMapOvr>
+</p:sld>
+</file>
+
+<file path=ppt/slides/slide15.xml><?xml version="1.0" encoding="utf-8"?>
+<p:sld xmlns:a="http://schemas.openxmlformats.org/drawingml/2006/main" xmlns:r="http://schemas.openxmlformats.org/officeDocument/2006/relationships" xmlns:p="http://schemas.openxmlformats.org/presentationml/2006/main">
+  <p:cSld>
+    <p:spTree>
+      <p:nvGrpSpPr>
+        <p:cNvPr id="1" name=""/>
+        <p:cNvGrpSpPr/>
+        <p:nvPr/>
+      </p:nvGrpSpPr>
+      <p:grpSpPr>
+        <a:xfrm>
+          <a:off x="0" y="0"/>
+          <a:ext cx="0" cy="0"/>
+          <a:chOff x="0" y="0"/>
+          <a:chExt cx="0" cy="0"/>
+        </a:xfrm>
+      </p:grpSpPr>
+      <p:sp>
+        <p:nvSpPr>
+          <p:cNvPr id="2" name="Title 1"/>
+          <p:cNvSpPr>
+            <a:spLocks noGrp="1"/>
+          </p:cNvSpPr>
+          <p:nvPr>
+            <p:ph type="title"/>
+          </p:nvPr>
+        </p:nvSpPr>
+        <p:spPr/>
+        <p:txBody>
+          <a:bodyPr/>
+          <a:lstStyle/>
+          <a:p>
+            <a:pPr algn="ctr"/>
+            <a:r>
+              <a:rPr lang="en-US" dirty="0" smtClean="0"/>
+              <a:t>Your Byte Education</a:t>
+            </a:r>
+            <a:endParaRPr lang="en-US" dirty="0"/>
+          </a:p>
+        </p:txBody>
+      </p:sp>
+      <p:sp>
+        <p:nvSpPr>
+          <p:cNvPr id="3" name="Content Placeholder 2"/>
+          <p:cNvSpPr>
+            <a:spLocks noGrp="1"/>
+          </p:cNvSpPr>
+          <p:nvPr>
+            <p:ph idx="1"/>
+          </p:nvPr>
+        </p:nvSpPr>
+        <p:spPr>
+          <a:xfrm>
+            <a:off x="1251678" y="1160586"/>
+            <a:ext cx="4382453" cy="5509846"/>
+          </a:xfrm>
+        </p:spPr>
+        <p:txBody>
+          <a:bodyPr>
+            <a:normAutofit lnSpcReduction="10000"/>
+          </a:bodyPr>
+          <a:lstStyle/>
+          <a:p>
+            <a:r>
+              <a:rPr lang="en-US" dirty="0" smtClean="0"/>
+              <a:t>Include Byte in the education section </a:t>
+            </a:r>
+          </a:p>
+          <a:p>
+            <a:r>
+              <a:rPr lang="en-US" dirty="0" smtClean="0"/>
+              <a:t>Write a paragraph about your Byte experience. </a:t>
+            </a:r>
+          </a:p>
+          <a:p>
+            <a:r>
+              <a:rPr lang="en-US" dirty="0" smtClean="0"/>
+              <a:t>What languages you used, what projects you worke</a:t>
+            </a:r>
+            <a:r>
+              <a:rPr lang="en-US" dirty="0" smtClean="0"/>
+              <a:t>d on, pair programming, and the like</a:t>
+            </a:r>
+          </a:p>
+          <a:p>
+            <a:r>
+              <a:rPr lang="en-US" dirty="0" smtClean="0"/>
+              <a:t>You can also just list this out.</a:t>
+            </a:r>
+          </a:p>
+          <a:p>
+            <a:r>
+              <a:rPr lang="en-US" dirty="0" smtClean="0"/>
+              <a:t>However, a paragraph is more descriptive, and since LinkedIn gives you the room for it you might as well use it</a:t>
+            </a:r>
+          </a:p>
+          <a:p>
+            <a:r>
+              <a:rPr lang="en-US" dirty="0" smtClean="0"/>
+              <a:t>Education should also include other schooling and/or certificate courses.</a:t>
+            </a:r>
+          </a:p>
+          <a:p>
+            <a:r>
+              <a:rPr lang="en-US" dirty="0" smtClean="0"/>
+              <a:t>Example: Code School allows you to put completed courses on LinkedIn</a:t>
+            </a:r>
+          </a:p>
+          <a:p>
+            <a:endParaRPr lang="en-US" dirty="0" smtClean="0"/>
+          </a:p>
+          <a:p>
+            <a:endParaRPr lang="en-US" dirty="0"/>
+          </a:p>
+        </p:txBody>
+      </p:sp>
+      <p:pic>
+        <p:nvPicPr>
+          <p:cNvPr id="4" name="Picture 3"/>
+          <p:cNvPicPr>
+            <a:picLocks noChangeAspect="1"/>
+          </p:cNvPicPr>
+          <p:nvPr/>
+        </p:nvPicPr>
+        <p:blipFill>
+          <a:blip r:embed="rId2">
+            <a:extLst>
+              <a:ext uri="{28A0092B-C50C-407E-A947-70E740481C1C}">
+                <a14:useLocalDpi xmlns:a14="http://schemas.microsoft.com/office/drawing/2010/main" val="0"/>
+              </a:ext>
+            </a:extLst>
+          </a:blip>
+          <a:stretch>
+            <a:fillRect/>
+          </a:stretch>
+        </p:blipFill>
+        <p:spPr>
+          <a:xfrm>
+            <a:off x="6050300" y="1172356"/>
+            <a:ext cx="4963531" cy="3100118"/>
+          </a:xfrm>
+          <a:prstGeom prst="rect">
+            <a:avLst/>
+          </a:prstGeom>
+        </p:spPr>
+      </p:pic>
+      <p:pic>
+        <p:nvPicPr>
+          <p:cNvPr id="5" name="Picture 4"/>
+          <p:cNvPicPr>
+            <a:picLocks noChangeAspect="1"/>
+          </p:cNvPicPr>
+          <p:nvPr/>
+        </p:nvPicPr>
+        <p:blipFill>
+          <a:blip r:embed="rId3">
+            <a:extLst>
+              <a:ext uri="{28A0092B-C50C-407E-A947-70E740481C1C}">
+                <a14:useLocalDpi xmlns:a14="http://schemas.microsoft.com/office/drawing/2010/main" val="0"/>
+              </a:ext>
+            </a:extLst>
+          </a:blip>
+          <a:stretch>
+            <a:fillRect/>
+          </a:stretch>
+        </p:blipFill>
+        <p:spPr>
+          <a:xfrm>
+            <a:off x="6050300" y="4344017"/>
+            <a:ext cx="4963531" cy="2270142"/>
+          </a:xfrm>
+          <a:prstGeom prst="rect">
+            <a:avLst/>
+          </a:prstGeom>
+        </p:spPr>
+      </p:pic>
+    </p:spTree>
+    <p:extLst>
+      <p:ext uri="{BB962C8B-B14F-4D97-AF65-F5344CB8AC3E}">
+        <p14:creationId xmlns:p14="http://schemas.microsoft.com/office/powerpoint/2010/main" val="232765871"/>
+      </p:ext>
+    </p:extLst>
+  </p:cSld>
+  <p:clrMapOvr>
+    <a:masterClrMapping/>
+  </p:clrMapOvr>
+</p:sld>
+</file>
+
+<file path=ppt/slides/slide16.xml><?xml version="1.0" encoding="utf-8"?>
+<p:sld xmlns:a="http://schemas.openxmlformats.org/drawingml/2006/main" xmlns:r="http://schemas.openxmlformats.org/officeDocument/2006/relationships" xmlns:p="http://schemas.openxmlformats.org/presentationml/2006/main">
+  <p:cSld>
+    <p:spTree>
+      <p:nvGrpSpPr>
+        <p:cNvPr id="1" name=""/>
+        <p:cNvGrpSpPr/>
+        <p:nvPr/>
+      </p:nvGrpSpPr>
+      <p:grpSpPr>
+        <a:xfrm>
+          <a:off x="0" y="0"/>
+          <a:ext cx="0" cy="0"/>
+          <a:chOff x="0" y="0"/>
+          <a:chExt cx="0" cy="0"/>
+        </a:xfrm>
+      </p:grpSpPr>
+      <p:sp>
+        <p:nvSpPr>
+          <p:cNvPr id="2" name="Title 1"/>
+          <p:cNvSpPr>
+            <a:spLocks noGrp="1"/>
+          </p:cNvSpPr>
+          <p:nvPr>
+            <p:ph type="title"/>
+          </p:nvPr>
+        </p:nvSpPr>
+        <p:spPr>
+          <a:xfrm>
+            <a:off x="1251678" y="159647"/>
+            <a:ext cx="10178322" cy="941166"/>
+          </a:xfrm>
+        </p:spPr>
+        <p:txBody>
+          <a:bodyPr/>
+          <a:lstStyle/>
+          <a:p>
+            <a:pPr algn="ctr"/>
+            <a:r>
+              <a:rPr lang="en-US" dirty="0" smtClean="0"/>
+              <a:t>Your Byte Experience</a:t>
+            </a:r>
+            <a:endParaRPr lang="en-US" dirty="0"/>
+          </a:p>
+        </p:txBody>
+      </p:sp>
+      <p:sp>
+        <p:nvSpPr>
+          <p:cNvPr id="3" name="Content Placeholder 2"/>
+          <p:cNvSpPr>
+            <a:spLocks noGrp="1"/>
+          </p:cNvSpPr>
+          <p:nvPr>
+            <p:ph idx="1"/>
+          </p:nvPr>
+        </p:nvSpPr>
+        <p:spPr>
+          <a:xfrm>
+            <a:off x="1251678" y="1160586"/>
+            <a:ext cx="10077961" cy="5509846"/>
+          </a:xfrm>
+        </p:spPr>
+        <p:txBody>
+          <a:bodyPr>
+            <a:normAutofit/>
+          </a:bodyPr>
+          <a:lstStyle/>
+          <a:p>
+            <a:r>
+              <a:rPr lang="en-US" dirty="0" smtClean="0"/>
+              <a:t>You can include “Student” in the title</a:t>
+            </a:r>
+          </a:p>
+          <a:p>
+            <a:r>
+              <a:rPr lang="en-US" dirty="0" smtClean="0"/>
+              <a:t>Write a summary of your experience</a:t>
+            </a:r>
+          </a:p>
+          <a:p>
+            <a:r>
+              <a:rPr lang="en-US" dirty="0" smtClean="0"/>
+              <a:t>Write bullets for your projects and languages used</a:t>
+            </a:r>
+          </a:p>
+          <a:p>
+            <a:pPr lvl="1"/>
+            <a:r>
+              <a:rPr lang="en-US" dirty="0"/>
+              <a:t>“Developed a political web application using Express, AJAX, and APIs to pull information regarding donations to legislators and the bills they </a:t>
+            </a:r>
+            <a:r>
+              <a:rPr lang="en-US" dirty="0" smtClean="0"/>
+              <a:t>sponsored.”</a:t>
+            </a:r>
+          </a:p>
+          <a:p>
+            <a:r>
+              <a:rPr lang="en-US" dirty="0" smtClean="0"/>
+              <a:t>Upload images and projects using the square box with a plus sign at the top right</a:t>
+            </a:r>
+          </a:p>
+          <a:p>
+            <a:r>
+              <a:rPr lang="en-US" dirty="0" smtClean="0"/>
+              <a:t>Include Other Experiences</a:t>
+            </a:r>
+          </a:p>
+          <a:p>
+            <a:r>
+              <a:rPr lang="en-US" dirty="0" smtClean="0"/>
+              <a:t>Full Time / Part Time / Volunteer</a:t>
+            </a:r>
+          </a:p>
+          <a:p>
+            <a:r>
+              <a:rPr lang="en-US" dirty="0" smtClean="0"/>
+              <a:t>Emphasize soft skills</a:t>
+            </a:r>
+          </a:p>
+          <a:p>
+            <a:pPr lvl="1"/>
+            <a:r>
+              <a:rPr lang="en-US" dirty="0" smtClean="0"/>
+              <a:t>Collaboration, taking initiative, and the like.</a:t>
+            </a:r>
+          </a:p>
+          <a:p>
+            <a:r>
+              <a:rPr lang="en-US" dirty="0" smtClean="0"/>
+              <a:t>Emphasize accomplishments,</a:t>
+            </a:r>
+          </a:p>
+          <a:p>
+            <a:pPr lvl="1"/>
+            <a:r>
+              <a:rPr lang="en-US" dirty="0" smtClean="0"/>
+              <a:t>If possible try to tailor them to the industry you want to move towards</a:t>
+            </a:r>
+            <a:endParaRPr lang="en-US" dirty="0"/>
+          </a:p>
+        </p:txBody>
+      </p:sp>
+      <p:pic>
+        <p:nvPicPr>
+          <p:cNvPr id="6" name="Picture 5"/>
+          <p:cNvPicPr>
+            <a:picLocks noChangeAspect="1"/>
+          </p:cNvPicPr>
+          <p:nvPr/>
+        </p:nvPicPr>
+        <p:blipFill>
+          <a:blip r:embed="rId2">
+            <a:extLst>
+              <a:ext uri="{28A0092B-C50C-407E-A947-70E740481C1C}">
+                <a14:useLocalDpi xmlns:a14="http://schemas.microsoft.com/office/drawing/2010/main" val="0"/>
+              </a:ext>
+            </a:extLst>
+          </a:blip>
+          <a:stretch>
+            <a:fillRect/>
+          </a:stretch>
+        </p:blipFill>
+        <p:spPr>
+          <a:xfrm>
+            <a:off x="6500667" y="3613651"/>
+            <a:ext cx="4828972" cy="893647"/>
+          </a:xfrm>
+          <a:prstGeom prst="rect">
+            <a:avLst/>
+          </a:prstGeom>
+        </p:spPr>
+      </p:pic>
+    </p:spTree>
+    <p:extLst>
+      <p:ext uri="{BB962C8B-B14F-4D97-AF65-F5344CB8AC3E}">
+        <p14:creationId xmlns:p14="http://schemas.microsoft.com/office/powerpoint/2010/main" val="377961463"/>
+      </p:ext>
+    </p:extLst>
+  </p:cSld>
+  <p:clrMapOvr>
+    <a:masterClrMapping/>
+  </p:clrMapOvr>
+</p:sld>
+</file>
+
+<file path=ppt/slides/slide17.xml><?xml version="1.0" encoding="utf-8"?>
+<p:sld xmlns:a="http://schemas.openxmlformats.org/drawingml/2006/main" xmlns:r="http://schemas.openxmlformats.org/officeDocument/2006/relationships" xmlns:p="http://schemas.openxmlformats.org/presentationml/2006/main">
+  <p:cSld>
+    <p:spTree>
+      <p:nvGrpSpPr>
+        <p:cNvPr id="1" name=""/>
+        <p:cNvGrpSpPr/>
+        <p:nvPr/>
+      </p:nvGrpSpPr>
+      <p:grpSpPr>
+        <a:xfrm>
+          <a:off x="0" y="0"/>
+          <a:ext cx="0" cy="0"/>
+          <a:chOff x="0" y="0"/>
+          <a:chExt cx="0" cy="0"/>
+        </a:xfrm>
+      </p:grpSpPr>
+      <p:sp>
+        <p:nvSpPr>
+          <p:cNvPr id="2" name="Title 1"/>
+          <p:cNvSpPr>
+            <a:spLocks noGrp="1"/>
+          </p:cNvSpPr>
+          <p:nvPr>
+            <p:ph type="title"/>
+          </p:nvPr>
+        </p:nvSpPr>
+        <p:spPr>
+          <a:xfrm>
+            <a:off x="858644" y="379141"/>
+            <a:ext cx="11050858" cy="1111022"/>
+          </a:xfrm>
+        </p:spPr>
+        <p:txBody>
+          <a:bodyPr/>
+          <a:lstStyle/>
+          <a:p>
+            <a:pPr algn="ctr"/>
+            <a:r>
+              <a:rPr lang="en-US" u="sng" dirty="0" smtClean="0"/>
+              <a:t>Skills / connections / Following</a:t>
+            </a:r>
+            <a:endParaRPr lang="en-US" u="sng" dirty="0"/>
+          </a:p>
+        </p:txBody>
+      </p:sp>
+      <p:sp>
+        <p:nvSpPr>
+          <p:cNvPr id="4" name="Text Placeholder 3"/>
+          <p:cNvSpPr>
+            <a:spLocks noGrp="1"/>
+          </p:cNvSpPr>
+          <p:nvPr>
+            <p:ph type="body" idx="1"/>
+          </p:nvPr>
+        </p:nvSpPr>
+        <p:spPr>
+          <a:xfrm>
+            <a:off x="1251678" y="1477824"/>
+            <a:ext cx="2796215" cy="632529"/>
+          </a:xfrm>
+        </p:spPr>
+        <p:txBody>
+          <a:bodyPr/>
+          <a:lstStyle/>
+          <a:p>
+            <a:pPr algn="ctr"/>
+            <a:r>
+              <a:rPr lang="en-US" dirty="0" smtClean="0"/>
+              <a:t>Skills</a:t>
+            </a:r>
+            <a:endParaRPr lang="en-US" dirty="0"/>
+          </a:p>
+        </p:txBody>
+      </p:sp>
+      <p:sp>
+        <p:nvSpPr>
+          <p:cNvPr id="3" name="Content Placeholder 2"/>
+          <p:cNvSpPr>
+            <a:spLocks noGrp="1"/>
+          </p:cNvSpPr>
+          <p:nvPr>
+            <p:ph sz="half" idx="2"/>
+          </p:nvPr>
+        </p:nvSpPr>
+        <p:spPr>
+          <a:xfrm>
+            <a:off x="1251678" y="2199633"/>
+            <a:ext cx="2790593" cy="3710512"/>
+          </a:xfrm>
+        </p:spPr>
+        <p:txBody>
+          <a:bodyPr>
+            <a:normAutofit fontScale="92500" lnSpcReduction="20000"/>
+          </a:bodyPr>
+          <a:lstStyle/>
+          <a:p>
+            <a:r>
+              <a:rPr lang="en-US" dirty="0" smtClean="0"/>
+              <a:t>Put down all the skills!</a:t>
+            </a:r>
+          </a:p>
+          <a:p>
+            <a:r>
+              <a:rPr lang="en-US" dirty="0" smtClean="0"/>
+              <a:t>Move the most relevant skills to the top</a:t>
+            </a:r>
+          </a:p>
+          <a:p>
+            <a:r>
+              <a:rPr lang="en-US" dirty="0" smtClean="0"/>
+              <a:t>Endorse your classmates for everything</a:t>
+            </a:r>
+          </a:p>
+          <a:p>
+            <a:r>
+              <a:rPr lang="en-US" dirty="0" smtClean="0"/>
+              <a:t>The more endorsements you have for a particular language the higher priority you will have for people searching for that skill</a:t>
+            </a:r>
+          </a:p>
+          <a:p>
+            <a:endParaRPr lang="en-US" dirty="0"/>
+          </a:p>
+        </p:txBody>
+      </p:sp>
+      <p:sp>
+        <p:nvSpPr>
+          <p:cNvPr id="7" name="Text Placeholder 3"/>
+          <p:cNvSpPr txBox="1">
+            <a:spLocks/>
+          </p:cNvSpPr>
+          <p:nvPr/>
+        </p:nvSpPr>
+        <p:spPr>
+          <a:xfrm>
+            <a:off x="4633286" y="1545718"/>
+            <a:ext cx="2796215" cy="564636"/>
+          </a:xfrm>
+          <a:prstGeom prst="rect">
+            <a:avLst/>
+          </a:prstGeom>
+        </p:spPr>
+        <p:txBody>
+          <a:bodyPr vert="horz" lIns="91440" tIns="45720" rIns="91440" bIns="45720" rtlCol="0" anchor="b">
+            <a:noAutofit/>
+          </a:bodyPr>
+          <a:lstStyle>
+            <a:lvl1pPr marL="0" indent="0" algn="l" defTabSz="914400" rtl="0" eaLnBrk="1" latinLnBrk="0" hangingPunct="1">
+              <a:lnSpc>
+                <a:spcPct val="100000"/>
+              </a:lnSpc>
+              <a:spcBef>
+                <a:spcPts val="700"/>
+              </a:spcBef>
+              <a:buClr>
+                <a:schemeClr val="tx2"/>
+              </a:buClr>
+              <a:buFont typeface="Arial" panose="020B0604020202020204" pitchFamily="34" charset="0"/>
+              <a:buNone/>
+              <a:defRPr sz="1900" b="1" kern="1200" cap="all" spc="200" baseline="0">
+                <a:solidFill>
+                  <a:schemeClr val="tx2"/>
+                </a:solidFill>
+                <a:latin typeface="+mn-lt"/>
+                <a:ea typeface="+mn-ea"/>
+                <a:cs typeface="+mn-cs"/>
+              </a:defRPr>
+            </a:lvl1pPr>
+            <a:lvl2pPr marL="457200" indent="0" algn="l" defTabSz="914400" rtl="0" eaLnBrk="1" latinLnBrk="0" hangingPunct="1">
+              <a:lnSpc>
+                <a:spcPct val="110000"/>
+              </a:lnSpc>
+              <a:spcBef>
+                <a:spcPts val="700"/>
+              </a:spcBef>
+              <a:buClr>
+                <a:schemeClr val="tx2"/>
+              </a:buClr>
+              <a:buFont typeface="Gill Sans MT" panose="020B0502020104020203" pitchFamily="34" charset="0"/>
+              <a:buNone/>
+              <a:defRPr sz="1900" b="1" kern="1200">
+                <a:solidFill>
+                  <a:schemeClr val="tx1">
+                    <a:lumMod val="65000"/>
+                    <a:lumOff val="35000"/>
+                  </a:schemeClr>
+                </a:solidFill>
+                <a:latin typeface="+mn-lt"/>
+                <a:ea typeface="+mn-ea"/>
+                <a:cs typeface="+mn-cs"/>
+              </a:defRPr>
+            </a:lvl2pPr>
+            <a:lvl3pPr marL="914400" indent="0" algn="l" defTabSz="914400" rtl="0" eaLnBrk="1" latinLnBrk="0" hangingPunct="1">
+              <a:lnSpc>
+                <a:spcPct val="110000"/>
+              </a:lnSpc>
+              <a:spcBef>
+                <a:spcPts val="700"/>
+              </a:spcBef>
+              <a:buClr>
+                <a:schemeClr val="tx2"/>
+              </a:buClr>
+              <a:buFont typeface="Arial" panose="020B0604020202020204" pitchFamily="34" charset="0"/>
+              <a:buNone/>
+              <a:defRPr sz="1800" b="1" kern="1200">
+                <a:solidFill>
+                  <a:schemeClr val="tx1">
+                    <a:lumMod val="65000"/>
+                    <a:lumOff val="35000"/>
+                  </a:schemeClr>
+                </a:solidFill>
+                <a:latin typeface="+mn-lt"/>
+                <a:ea typeface="+mn-ea"/>
+                <a:cs typeface="+mn-cs"/>
+              </a:defRPr>
+            </a:lvl3pPr>
+            <a:lvl4pPr marL="1371600" indent="0" algn="l" defTabSz="914400" rtl="0" eaLnBrk="1" latinLnBrk="0" hangingPunct="1">
+              <a:lnSpc>
+                <a:spcPct val="110000"/>
+              </a:lnSpc>
+              <a:spcBef>
+                <a:spcPts val="700"/>
+              </a:spcBef>
+              <a:buClr>
+                <a:schemeClr val="tx2"/>
+              </a:buClr>
+              <a:buFont typeface="Gill Sans MT" panose="020B0502020104020203" pitchFamily="34" charset="0"/>
+              <a:buNone/>
+              <a:defRPr sz="1600" b="1" kern="1200">
+                <a:solidFill>
+                  <a:schemeClr val="tx1">
+                    <a:lumMod val="65000"/>
+                    <a:lumOff val="35000"/>
+                  </a:schemeClr>
+                </a:solidFill>
+                <a:latin typeface="+mn-lt"/>
+                <a:ea typeface="+mn-ea"/>
+                <a:cs typeface="+mn-cs"/>
+              </a:defRPr>
+            </a:lvl4pPr>
+            <a:lvl5pPr marL="1828800" indent="0" algn="l" defTabSz="914400" rtl="0" eaLnBrk="1" latinLnBrk="0" hangingPunct="1">
+              <a:lnSpc>
+                <a:spcPct val="110000"/>
+              </a:lnSpc>
+              <a:spcBef>
+                <a:spcPts val="700"/>
+              </a:spcBef>
+              <a:buClr>
+                <a:schemeClr val="tx2"/>
+              </a:buClr>
+              <a:buFont typeface="Arial" panose="020B0604020202020204" pitchFamily="34" charset="0"/>
+              <a:buNone/>
+              <a:defRPr sz="1600" b="1" kern="1200">
+                <a:solidFill>
+                  <a:schemeClr val="tx1">
+                    <a:lumMod val="65000"/>
+                    <a:lumOff val="35000"/>
+                  </a:schemeClr>
+                </a:solidFill>
+                <a:latin typeface="+mn-lt"/>
+                <a:ea typeface="+mn-ea"/>
+                <a:cs typeface="+mn-cs"/>
+              </a:defRPr>
+            </a:lvl5pPr>
+            <a:lvl6pPr marL="2286000" indent="0" algn="l" defTabSz="914400" rtl="0" eaLnBrk="1" latinLnBrk="0" hangingPunct="1">
+              <a:lnSpc>
+                <a:spcPct val="110000"/>
+              </a:lnSpc>
+              <a:spcBef>
+                <a:spcPts val="700"/>
+              </a:spcBef>
+              <a:buClr>
+                <a:schemeClr val="tx2"/>
+              </a:buClr>
+              <a:buFont typeface="Gill Sans MT" panose="020B0502020104020203" pitchFamily="34" charset="0"/>
+              <a:buNone/>
+              <a:defRPr sz="1600" b="1" kern="1200">
+                <a:solidFill>
+                  <a:schemeClr val="tx1">
+                    <a:lumMod val="65000"/>
+                    <a:lumOff val="35000"/>
+                  </a:schemeClr>
+                </a:solidFill>
+                <a:latin typeface="+mn-lt"/>
+                <a:ea typeface="+mn-ea"/>
+                <a:cs typeface="+mn-cs"/>
+              </a:defRPr>
+            </a:lvl6pPr>
+            <a:lvl7pPr marL="2743200" indent="0" algn="l" defTabSz="914400" rtl="0" eaLnBrk="1" latinLnBrk="0" hangingPunct="1">
+              <a:lnSpc>
+                <a:spcPct val="110000"/>
+              </a:lnSpc>
+              <a:spcBef>
+                <a:spcPts val="700"/>
+              </a:spcBef>
+              <a:buClr>
+                <a:schemeClr val="tx2"/>
+              </a:buClr>
+              <a:buFont typeface="Arial" panose="020B0604020202020204" pitchFamily="34" charset="0"/>
+              <a:buNone/>
+              <a:defRPr sz="1600" b="1" kern="1200">
+                <a:solidFill>
+                  <a:schemeClr val="tx1">
+                    <a:lumMod val="65000"/>
+                    <a:lumOff val="35000"/>
+                  </a:schemeClr>
+                </a:solidFill>
+                <a:latin typeface="+mn-lt"/>
+                <a:ea typeface="+mn-ea"/>
+                <a:cs typeface="+mn-cs"/>
+              </a:defRPr>
+            </a:lvl7pPr>
+            <a:lvl8pPr marL="3200400" indent="0" algn="l" defTabSz="914400" rtl="0" eaLnBrk="1" latinLnBrk="0" hangingPunct="1">
+              <a:lnSpc>
+                <a:spcPct val="110000"/>
+              </a:lnSpc>
+              <a:spcBef>
+                <a:spcPts val="700"/>
+              </a:spcBef>
+              <a:buClr>
+                <a:schemeClr val="tx2"/>
+              </a:buClr>
+              <a:buFont typeface="Gill Sans MT" panose="020B0502020104020203" pitchFamily="34" charset="0"/>
+              <a:buNone/>
+              <a:defRPr sz="1600" b="1" kern="1200" baseline="0">
+                <a:solidFill>
+                  <a:schemeClr val="tx1">
+                    <a:lumMod val="65000"/>
+                    <a:lumOff val="35000"/>
+                  </a:schemeClr>
+                </a:solidFill>
+                <a:latin typeface="+mn-lt"/>
+                <a:ea typeface="+mn-ea"/>
+                <a:cs typeface="+mn-cs"/>
+              </a:defRPr>
+            </a:lvl8pPr>
+            <a:lvl9pPr marL="3657600" indent="0" algn="l" defTabSz="914400" rtl="0" eaLnBrk="1" latinLnBrk="0" hangingPunct="1">
+              <a:lnSpc>
+                <a:spcPct val="110000"/>
+              </a:lnSpc>
+              <a:spcBef>
+                <a:spcPts val="700"/>
+              </a:spcBef>
+              <a:buClr>
+                <a:schemeClr val="tx2"/>
+              </a:buClr>
+              <a:buFont typeface="Arial" panose="020B0604020202020204" pitchFamily="34" charset="0"/>
+              <a:buNone/>
+              <a:defRPr sz="1600" b="1" kern="1200" baseline="0">
+                <a:solidFill>
+                  <a:schemeClr val="tx1">
+                    <a:lumMod val="65000"/>
+                    <a:lumOff val="35000"/>
+                  </a:schemeClr>
+                </a:solidFill>
+                <a:latin typeface="+mn-lt"/>
+                <a:ea typeface="+mn-ea"/>
+                <a:cs typeface="+mn-cs"/>
+              </a:defRPr>
+            </a:lvl9pPr>
+          </a:lstStyle>
+          <a:p>
+            <a:pPr algn="ctr"/>
+            <a:r>
+              <a:rPr lang="en-US" dirty="0" smtClean="0"/>
+              <a:t>Connections</a:t>
+            </a:r>
+            <a:endParaRPr lang="en-US" dirty="0"/>
+          </a:p>
+        </p:txBody>
+      </p:sp>
+      <p:sp>
+        <p:nvSpPr>
+          <p:cNvPr id="9" name="Text Placeholder 3"/>
+          <p:cNvSpPr txBox="1">
+            <a:spLocks/>
+          </p:cNvSpPr>
+          <p:nvPr/>
+        </p:nvSpPr>
+        <p:spPr>
+          <a:xfrm>
+            <a:off x="8666218" y="1630252"/>
+            <a:ext cx="2796215" cy="480102"/>
+          </a:xfrm>
+          <a:prstGeom prst="rect">
+            <a:avLst/>
+          </a:prstGeom>
+        </p:spPr>
+        <p:txBody>
+          <a:bodyPr vert="horz" lIns="91440" tIns="45720" rIns="91440" bIns="45720" rtlCol="0" anchor="b">
+            <a:noAutofit/>
+          </a:bodyPr>
+          <a:lstStyle>
+            <a:lvl1pPr marL="0" indent="0" algn="l" defTabSz="914400" rtl="0" eaLnBrk="1" latinLnBrk="0" hangingPunct="1">
+              <a:lnSpc>
+                <a:spcPct val="100000"/>
+              </a:lnSpc>
+              <a:spcBef>
+                <a:spcPts val="700"/>
+              </a:spcBef>
+              <a:buClr>
+                <a:schemeClr val="tx2"/>
+              </a:buClr>
+              <a:buFont typeface="Arial" panose="020B0604020202020204" pitchFamily="34" charset="0"/>
+              <a:buNone/>
+              <a:defRPr sz="1900" b="1" kern="1200" cap="all" spc="200" baseline="0">
+                <a:solidFill>
+                  <a:schemeClr val="tx2"/>
+                </a:solidFill>
+                <a:latin typeface="+mn-lt"/>
+                <a:ea typeface="+mn-ea"/>
+                <a:cs typeface="+mn-cs"/>
+              </a:defRPr>
+            </a:lvl1pPr>
+            <a:lvl2pPr marL="457200" indent="0" algn="l" defTabSz="914400" rtl="0" eaLnBrk="1" latinLnBrk="0" hangingPunct="1">
+              <a:lnSpc>
+                <a:spcPct val="110000"/>
+              </a:lnSpc>
+              <a:spcBef>
+                <a:spcPts val="700"/>
+              </a:spcBef>
+              <a:buClr>
+                <a:schemeClr val="tx2"/>
+              </a:buClr>
+              <a:buFont typeface="Gill Sans MT" panose="020B0502020104020203" pitchFamily="34" charset="0"/>
+              <a:buNone/>
+              <a:defRPr sz="1900" b="1" kern="1200">
+                <a:solidFill>
+                  <a:schemeClr val="tx1">
+                    <a:lumMod val="65000"/>
+                    <a:lumOff val="35000"/>
+                  </a:schemeClr>
+                </a:solidFill>
+                <a:latin typeface="+mn-lt"/>
+                <a:ea typeface="+mn-ea"/>
+                <a:cs typeface="+mn-cs"/>
+              </a:defRPr>
+            </a:lvl2pPr>
+            <a:lvl3pPr marL="914400" indent="0" algn="l" defTabSz="914400" rtl="0" eaLnBrk="1" latinLnBrk="0" hangingPunct="1">
+              <a:lnSpc>
+                <a:spcPct val="110000"/>
+              </a:lnSpc>
+              <a:spcBef>
+                <a:spcPts val="700"/>
+              </a:spcBef>
+              <a:buClr>
+                <a:schemeClr val="tx2"/>
+              </a:buClr>
+              <a:buFont typeface="Arial" panose="020B0604020202020204" pitchFamily="34" charset="0"/>
+              <a:buNone/>
+              <a:defRPr sz="1800" b="1" kern="1200">
+                <a:solidFill>
+                  <a:schemeClr val="tx1">
+                    <a:lumMod val="65000"/>
+                    <a:lumOff val="35000"/>
+                  </a:schemeClr>
+                </a:solidFill>
+                <a:latin typeface="+mn-lt"/>
+                <a:ea typeface="+mn-ea"/>
+                <a:cs typeface="+mn-cs"/>
+              </a:defRPr>
+            </a:lvl3pPr>
+            <a:lvl4pPr marL="1371600" indent="0" algn="l" defTabSz="914400" rtl="0" eaLnBrk="1" latinLnBrk="0" hangingPunct="1">
+              <a:lnSpc>
+                <a:spcPct val="110000"/>
+              </a:lnSpc>
+              <a:spcBef>
+                <a:spcPts val="700"/>
+              </a:spcBef>
+              <a:buClr>
+                <a:schemeClr val="tx2"/>
+              </a:buClr>
+              <a:buFont typeface="Gill Sans MT" panose="020B0502020104020203" pitchFamily="34" charset="0"/>
+              <a:buNone/>
+              <a:defRPr sz="1600" b="1" kern="1200">
+                <a:solidFill>
+                  <a:schemeClr val="tx1">
+                    <a:lumMod val="65000"/>
+                    <a:lumOff val="35000"/>
+                  </a:schemeClr>
+                </a:solidFill>
+                <a:latin typeface="+mn-lt"/>
+                <a:ea typeface="+mn-ea"/>
+                <a:cs typeface="+mn-cs"/>
+              </a:defRPr>
+            </a:lvl4pPr>
+            <a:lvl5pPr marL="1828800" indent="0" algn="l" defTabSz="914400" rtl="0" eaLnBrk="1" latinLnBrk="0" hangingPunct="1">
+              <a:lnSpc>
+                <a:spcPct val="110000"/>
+              </a:lnSpc>
+              <a:spcBef>
+                <a:spcPts val="700"/>
+              </a:spcBef>
+              <a:buClr>
+                <a:schemeClr val="tx2"/>
+              </a:buClr>
+              <a:buFont typeface="Arial" panose="020B0604020202020204" pitchFamily="34" charset="0"/>
+              <a:buNone/>
+              <a:defRPr sz="1600" b="1" kern="1200">
+                <a:solidFill>
+                  <a:schemeClr val="tx1">
+                    <a:lumMod val="65000"/>
+                    <a:lumOff val="35000"/>
+                  </a:schemeClr>
+                </a:solidFill>
+                <a:latin typeface="+mn-lt"/>
+                <a:ea typeface="+mn-ea"/>
+                <a:cs typeface="+mn-cs"/>
+              </a:defRPr>
+            </a:lvl5pPr>
+            <a:lvl6pPr marL="2286000" indent="0" algn="l" defTabSz="914400" rtl="0" eaLnBrk="1" latinLnBrk="0" hangingPunct="1">
+              <a:lnSpc>
+                <a:spcPct val="110000"/>
+              </a:lnSpc>
+              <a:spcBef>
+                <a:spcPts val="700"/>
+              </a:spcBef>
+              <a:buClr>
+                <a:schemeClr val="tx2"/>
+              </a:buClr>
+              <a:buFont typeface="Gill Sans MT" panose="020B0502020104020203" pitchFamily="34" charset="0"/>
+              <a:buNone/>
+              <a:defRPr sz="1600" b="1" kern="1200">
+                <a:solidFill>
+                  <a:schemeClr val="tx1">
+                    <a:lumMod val="65000"/>
+                    <a:lumOff val="35000"/>
+                  </a:schemeClr>
+                </a:solidFill>
+                <a:latin typeface="+mn-lt"/>
+                <a:ea typeface="+mn-ea"/>
+                <a:cs typeface="+mn-cs"/>
+              </a:defRPr>
+            </a:lvl6pPr>
+            <a:lvl7pPr marL="2743200" indent="0" algn="l" defTabSz="914400" rtl="0" eaLnBrk="1" latinLnBrk="0" hangingPunct="1">
+              <a:lnSpc>
+                <a:spcPct val="110000"/>
+              </a:lnSpc>
+              <a:spcBef>
+                <a:spcPts val="700"/>
+              </a:spcBef>
+              <a:buClr>
+                <a:schemeClr val="tx2"/>
+              </a:buClr>
+              <a:buFont typeface="Arial" panose="020B0604020202020204" pitchFamily="34" charset="0"/>
+              <a:buNone/>
+              <a:defRPr sz="1600" b="1" kern="1200">
+                <a:solidFill>
+                  <a:schemeClr val="tx1">
+                    <a:lumMod val="65000"/>
+                    <a:lumOff val="35000"/>
+                  </a:schemeClr>
+                </a:solidFill>
+                <a:latin typeface="+mn-lt"/>
+                <a:ea typeface="+mn-ea"/>
+                <a:cs typeface="+mn-cs"/>
+              </a:defRPr>
+            </a:lvl7pPr>
+            <a:lvl8pPr marL="3200400" indent="0" algn="l" defTabSz="914400" rtl="0" eaLnBrk="1" latinLnBrk="0" hangingPunct="1">
+              <a:lnSpc>
+                <a:spcPct val="110000"/>
+              </a:lnSpc>
+              <a:spcBef>
+                <a:spcPts val="700"/>
+              </a:spcBef>
+              <a:buClr>
+                <a:schemeClr val="tx2"/>
+              </a:buClr>
+              <a:buFont typeface="Gill Sans MT" panose="020B0502020104020203" pitchFamily="34" charset="0"/>
+              <a:buNone/>
+              <a:defRPr sz="1600" b="1" kern="1200" baseline="0">
+                <a:solidFill>
+                  <a:schemeClr val="tx1">
+                    <a:lumMod val="65000"/>
+                    <a:lumOff val="35000"/>
+                  </a:schemeClr>
+                </a:solidFill>
+                <a:latin typeface="+mn-lt"/>
+                <a:ea typeface="+mn-ea"/>
+                <a:cs typeface="+mn-cs"/>
+              </a:defRPr>
+            </a:lvl8pPr>
+            <a:lvl9pPr marL="3657600" indent="0" algn="l" defTabSz="914400" rtl="0" eaLnBrk="1" latinLnBrk="0" hangingPunct="1">
+              <a:lnSpc>
+                <a:spcPct val="110000"/>
+              </a:lnSpc>
+              <a:spcBef>
+                <a:spcPts val="700"/>
+              </a:spcBef>
+              <a:buClr>
+                <a:schemeClr val="tx2"/>
+              </a:buClr>
+              <a:buFont typeface="Arial" panose="020B0604020202020204" pitchFamily="34" charset="0"/>
+              <a:buNone/>
+              <a:defRPr sz="1600" b="1" kern="1200" baseline="0">
+                <a:solidFill>
+                  <a:schemeClr val="tx1">
+                    <a:lumMod val="65000"/>
+                    <a:lumOff val="35000"/>
+                  </a:schemeClr>
+                </a:solidFill>
+                <a:latin typeface="+mn-lt"/>
+                <a:ea typeface="+mn-ea"/>
+                <a:cs typeface="+mn-cs"/>
+              </a:defRPr>
+            </a:lvl9pPr>
+          </a:lstStyle>
+          <a:p>
+            <a:pPr algn="ctr"/>
+            <a:r>
+              <a:rPr lang="en-US" dirty="0" smtClean="0"/>
+              <a:t>Following</a:t>
+            </a:r>
+            <a:endParaRPr lang="en-US" dirty="0"/>
+          </a:p>
+        </p:txBody>
+      </p:sp>
+      <p:sp>
+        <p:nvSpPr>
+          <p:cNvPr id="10" name="Content Placeholder 2"/>
+          <p:cNvSpPr>
+            <a:spLocks noGrp="1"/>
+          </p:cNvSpPr>
+          <p:nvPr>
+            <p:ph sz="half" idx="2"/>
+          </p:nvPr>
+        </p:nvSpPr>
+        <p:spPr>
+          <a:xfrm>
+            <a:off x="4633286" y="2242980"/>
+            <a:ext cx="2790593" cy="3879040"/>
+          </a:xfrm>
+        </p:spPr>
+        <p:txBody>
+          <a:bodyPr>
+            <a:normAutofit/>
+          </a:bodyPr>
+          <a:lstStyle/>
+          <a:p>
+            <a:r>
+              <a:rPr lang="en-US" sz="1900" dirty="0" smtClean="0"/>
+              <a:t>Do not feel the need to accept people you don’t know</a:t>
+            </a:r>
+          </a:p>
+          <a:p>
+            <a:r>
+              <a:rPr lang="en-US" sz="1900" dirty="0" smtClean="0"/>
+              <a:t>If you want to connect with somebody do not use a default message</a:t>
+            </a:r>
+          </a:p>
+          <a:p>
+            <a:r>
+              <a:rPr lang="en-US" sz="1900" dirty="0" smtClean="0"/>
+              <a:t>Write a personalized note</a:t>
+            </a:r>
+          </a:p>
+          <a:p>
+            <a:r>
+              <a:rPr lang="en-US" sz="1900" dirty="0" smtClean="0"/>
+              <a:t>Accept a connection within one business day</a:t>
+            </a:r>
+            <a:endParaRPr lang="en-US" sz="1900" dirty="0"/>
+          </a:p>
+        </p:txBody>
+      </p:sp>
+      <p:sp>
+        <p:nvSpPr>
+          <p:cNvPr id="11" name="Content Placeholder 2"/>
+          <p:cNvSpPr>
+            <a:spLocks noGrp="1"/>
+          </p:cNvSpPr>
+          <p:nvPr>
+            <p:ph sz="half" idx="2"/>
+          </p:nvPr>
+        </p:nvSpPr>
+        <p:spPr>
+          <a:xfrm>
+            <a:off x="8671840" y="2242979"/>
+            <a:ext cx="2790593" cy="3667165"/>
+          </a:xfrm>
+        </p:spPr>
+        <p:txBody>
+          <a:bodyPr>
+            <a:normAutofit/>
+          </a:bodyPr>
+          <a:lstStyle/>
+          <a:p>
+            <a:r>
+              <a:rPr lang="en-US" dirty="0" smtClean="0"/>
+              <a:t>Follow groups that you like and/or are relevant to your industry</a:t>
+            </a:r>
+          </a:p>
+          <a:p>
+            <a:r>
+              <a:rPr lang="en-US" dirty="0" smtClean="0"/>
+              <a:t>Follow companies that you like</a:t>
+            </a:r>
+          </a:p>
+          <a:p>
+            <a:r>
+              <a:rPr lang="en-US" dirty="0" smtClean="0"/>
+              <a:t>Follow leaders in your industry</a:t>
+            </a:r>
+            <a:endParaRPr lang="en-US" dirty="0"/>
+          </a:p>
+        </p:txBody>
+      </p:sp>
+    </p:spTree>
+    <p:extLst>
+      <p:ext uri="{BB962C8B-B14F-4D97-AF65-F5344CB8AC3E}">
+        <p14:creationId xmlns:p14="http://schemas.microsoft.com/office/powerpoint/2010/main" val="786106490"/>
+      </p:ext>
+    </p:extLst>
+  </p:cSld>
+  <p:clrMapOvr>
+    <a:masterClrMapping/>
+  </p:clrMapOvr>
+</p:sld>
+</file>
+
 <file path=ppt/slides/slide2.xml><?xml version="1.0" encoding="utf-8"?>
 <p:sld xmlns:a="http://schemas.openxmlformats.org/drawingml/2006/main" xmlns:r="http://schemas.openxmlformats.org/officeDocument/2006/relationships" xmlns:p="http://schemas.openxmlformats.org/presentationml/2006/main">
   <p:cSld>
@@ -8019,7 +10252,7 @@
             <a:spLocks noGrp="1"/>
           </p:cNvSpPr>
           <p:nvPr>
-            <p:ph type="title"/>
+            <p:ph type="ctrTitle"/>
           </p:nvPr>
         </p:nvSpPr>
         <p:spPr/>
@@ -8030,7 +10263,14 @@
             <a:pPr algn="ctr"/>
             <a:r>
               <a:rPr lang="en-US" dirty="0" smtClean="0"/>
-              <a:t>LinkedIn</a:t>
+              <a:t>Resume</a:t>
+            </a:r>
+            <a:br>
+              <a:rPr lang="en-US" dirty="0" smtClean="0"/>
+            </a:br>
+            <a:r>
+              <a:rPr lang="en-US" dirty="0" smtClean="0"/>
+              <a:t>Writing</a:t>
             </a:r>
             <a:endParaRPr lang="en-US" dirty="0"/>
           </a:p>
@@ -8038,12 +10278,12 @@
       </p:sp>
       <p:sp>
         <p:nvSpPr>
-          <p:cNvPr id="3" name="Content Placeholder 2"/>
+          <p:cNvPr id="4" name="Subtitle 3"/>
           <p:cNvSpPr>
             <a:spLocks noGrp="1"/>
           </p:cNvSpPr>
           <p:nvPr>
-            <p:ph idx="1"/>
+            <p:ph type="subTitle" idx="1"/>
           </p:nvPr>
         </p:nvSpPr>
         <p:spPr/>
@@ -8051,52 +10291,14 @@
           <a:bodyPr/>
           <a:lstStyle/>
           <a:p>
-            <a:r>
-              <a:rPr lang="en-US" dirty="0" smtClean="0"/>
-              <a:t>Change the “notify your network” to a no. This can be done on the right hand side OR in your privacy settings</a:t>
-            </a:r>
-          </a:p>
-          <a:p>
-            <a:r>
-              <a:rPr lang="en-US" dirty="0" smtClean="0"/>
-              <a:t>Headshot / Headline</a:t>
-            </a:r>
-          </a:p>
-          <a:p>
-            <a:r>
-              <a:rPr lang="en-US" dirty="0" smtClean="0"/>
-              <a:t>Summary / Industry / URL</a:t>
-            </a:r>
-          </a:p>
-          <a:p>
-            <a:r>
-              <a:rPr lang="en-US" dirty="0" smtClean="0"/>
-              <a:t>Experience / Education</a:t>
-            </a:r>
-          </a:p>
-          <a:p>
-            <a:r>
-              <a:rPr lang="en-US" dirty="0" smtClean="0"/>
-              <a:t>Skills / Endorsements</a:t>
-            </a:r>
-          </a:p>
-          <a:p>
-            <a:r>
-              <a:rPr lang="en-US" dirty="0" smtClean="0"/>
-              <a:t>Connections / </a:t>
-            </a:r>
-            <a:r>
-              <a:rPr lang="en-US" dirty="0" err="1" smtClean="0"/>
-              <a:t>Misc</a:t>
-            </a:r>
-            <a:endParaRPr lang="en-US" dirty="0"/>
+            <a:endParaRPr lang="en-US"/>
           </a:p>
         </p:txBody>
       </p:sp>
     </p:spTree>
     <p:extLst>
       <p:ext uri="{BB962C8B-B14F-4D97-AF65-F5344CB8AC3E}">
-        <p14:creationId xmlns:p14="http://schemas.microsoft.com/office/powerpoint/2010/main" val="1838135563"/>
+        <p14:creationId xmlns:p14="http://schemas.microsoft.com/office/powerpoint/2010/main" val="1672373949"/>
       </p:ext>
     </p:extLst>
   </p:cSld>
@@ -8125,99 +10327,189 @@
       </p:grpSpPr>
       <p:sp>
         <p:nvSpPr>
-          <p:cNvPr id="4" name="Title 3"/>
+          <p:cNvPr id="5" name="Title 4"/>
           <p:cNvSpPr>
             <a:spLocks noGrp="1"/>
           </p:cNvSpPr>
           <p:nvPr>
-            <p:ph type="title"/>
+            <p:ph type="title" idx="4294967295"/>
           </p:nvPr>
         </p:nvSpPr>
-        <p:spPr/>
+        <p:spPr>
+          <a:xfrm>
+            <a:off x="981319" y="422031"/>
+            <a:ext cx="10179050" cy="832338"/>
+          </a:xfrm>
+        </p:spPr>
         <p:txBody>
           <a:bodyPr/>
           <a:lstStyle/>
           <a:p>
-            <a:r>
-              <a:rPr lang="en-US" dirty="0" smtClean="0"/>
-              <a:t>Headshot</a:t>
-            </a:r>
-            <a:endParaRPr lang="en-US" dirty="0"/>
-          </a:p>
-        </p:txBody>
-      </p:sp>
-      <p:sp>
-        <p:nvSpPr>
-          <p:cNvPr id="5" name="Content Placeholder 4"/>
-          <p:cNvSpPr>
-            <a:spLocks noGrp="1"/>
-          </p:cNvSpPr>
-          <p:nvPr>
-            <p:ph idx="1"/>
-          </p:nvPr>
-        </p:nvSpPr>
-        <p:spPr/>
-        <p:txBody>
-          <a:bodyPr>
-            <a:normAutofit/>
+            <a:pPr algn="ctr"/>
+            <a:r>
+              <a:rPr lang="en-US" b="1" u="sng" dirty="0" smtClean="0"/>
+              <a:t>Your Highlight Reel</a:t>
+            </a:r>
+            <a:endParaRPr lang="en-US" b="1" u="sng" dirty="0"/>
+          </a:p>
+        </p:txBody>
+      </p:sp>
+      <p:sp>
+        <p:nvSpPr>
+          <p:cNvPr id="8" name="TextBox 7"/>
+          <p:cNvSpPr txBox="1"/>
+          <p:nvPr/>
+        </p:nvSpPr>
+        <p:spPr>
+          <a:xfrm>
+            <a:off x="1211137" y="2315252"/>
+            <a:ext cx="8532657" cy="1477328"/>
+          </a:xfrm>
+          <a:prstGeom prst="rect">
+            <a:avLst/>
+          </a:prstGeom>
+          <a:noFill/>
+        </p:spPr>
+        <p:txBody>
+          <a:bodyPr wrap="none" rtlCol="0">
+            <a:spAutoFit/>
           </a:bodyPr>
           <a:lstStyle/>
           <a:p>
-            <a:r>
-              <a:rPr lang="en-US" dirty="0" smtClean="0"/>
-              <a:t>This is the first thing people will see when visiting your profile</a:t>
-            </a:r>
-          </a:p>
-          <a:p>
-            <a:r>
-              <a:rPr lang="en-US" dirty="0" smtClean="0"/>
-              <a:t>Get an image that just shows your head and shoulders</a:t>
-            </a:r>
-          </a:p>
-          <a:p>
-            <a:r>
-              <a:rPr lang="en-US" dirty="0" smtClean="0"/>
-              <a:t>If it’s a more creative image feel free to use that</a:t>
-            </a:r>
-          </a:p>
-          <a:p>
-            <a:r>
-              <a:rPr lang="en-US" dirty="0" smtClean="0"/>
-              <a:t>Make sure to wear nice clothing</a:t>
-            </a:r>
-          </a:p>
-          <a:p>
-            <a:pPr lvl="1"/>
-            <a:r>
-              <a:rPr lang="en-US" dirty="0" smtClean="0"/>
-              <a:t>Clean clothing</a:t>
-            </a:r>
-          </a:p>
-          <a:p>
-            <a:pPr lvl="1"/>
-            <a:r>
-              <a:rPr lang="en-US" dirty="0" smtClean="0"/>
-              <a:t>Ironed clothing</a:t>
-            </a:r>
-          </a:p>
-          <a:p>
-            <a:pPr lvl="1"/>
-            <a:r>
-              <a:rPr lang="en-US" dirty="0" smtClean="0"/>
-              <a:t>No deep </a:t>
+            <a:pPr marL="285750" indent="-285750">
+              <a:buFont typeface="Arial" charset="0"/>
+              <a:buChar char="•"/>
+            </a:pPr>
+            <a:r>
+              <a:rPr lang="en-US" dirty="0" smtClean="0"/>
+              <a:t>Your Resume is meant to get you in the door, in front of </a:t>
             </a:r>
             <a:r>
               <a:rPr lang="en-US" smtClean="0"/>
-              <a:t>v-necks</a:t>
+              <a:t>a human being</a:t>
             </a:r>
             <a:endParaRPr lang="en-US" dirty="0" smtClean="0"/>
+          </a:p>
+          <a:p>
+            <a:pPr marL="285750" indent="-285750">
+              <a:buFont typeface="Arial" charset="0"/>
+              <a:buChar char="•"/>
+            </a:pPr>
+            <a:r>
+              <a:rPr lang="en-US" dirty="0" smtClean="0"/>
+              <a:t>You will have multiple versions of your resume</a:t>
+            </a:r>
+          </a:p>
+          <a:p>
+            <a:pPr marL="285750" indent="-285750">
+              <a:buFont typeface="Arial" charset="0"/>
+              <a:buChar char="•"/>
+            </a:pPr>
+            <a:r>
+              <a:rPr lang="en-US" dirty="0" smtClean="0"/>
+              <a:t>Recruiters / Human Resources spend an average of seven seconds looking at a resume</a:t>
+            </a:r>
+          </a:p>
+          <a:p>
+            <a:pPr marL="285750" indent="-285750">
+              <a:buFont typeface="Arial" charset="0"/>
+              <a:buChar char="•"/>
+            </a:pPr>
+            <a:r>
+              <a:rPr lang="en-US" dirty="0" smtClean="0"/>
+              <a:t>Who is your resume going to? Tech Person? Recruiter? HR Person?</a:t>
+            </a:r>
+          </a:p>
+          <a:p>
+            <a:pPr marL="285750" indent="-285750">
+              <a:buFont typeface="Arial" charset="0"/>
+              <a:buChar char="•"/>
+            </a:pPr>
+            <a:r>
+              <a:rPr lang="en-US" dirty="0" smtClean="0"/>
+              <a:t>Keep it to one page. EXTREMELY RARE to have multiple pages. </a:t>
+            </a:r>
+            <a:endParaRPr lang="en-US" dirty="0"/>
           </a:p>
         </p:txBody>
       </p:sp>
     </p:spTree>
     <p:extLst>
       <p:ext uri="{BB962C8B-B14F-4D97-AF65-F5344CB8AC3E}">
-        <p14:creationId xmlns:p14="http://schemas.microsoft.com/office/powerpoint/2010/main" val="514598276"/>
+        <p14:creationId xmlns:p14="http://schemas.microsoft.com/office/powerpoint/2010/main" val="159072659"/>
+      </p:ext>
+    </p:extLst>
+  </p:cSld>
+  <p:clrMapOvr>
+    <a:masterClrMapping/>
+  </p:clrMapOvr>
+</p:sld>
+</file>
+
+<file path=ppt/slides/slide9.xml><?xml version="1.0" encoding="utf-8"?>
+<p:sld xmlns:a="http://schemas.openxmlformats.org/drawingml/2006/main" xmlns:r="http://schemas.openxmlformats.org/officeDocument/2006/relationships" xmlns:p="http://schemas.openxmlformats.org/presentationml/2006/main">
+  <p:cSld>
+    <p:spTree>
+      <p:nvGrpSpPr>
+        <p:cNvPr id="1" name=""/>
+        <p:cNvGrpSpPr/>
+        <p:nvPr/>
+      </p:nvGrpSpPr>
+      <p:grpSpPr>
+        <a:xfrm>
+          <a:off x="0" y="0"/>
+          <a:ext cx="0" cy="0"/>
+          <a:chOff x="0" y="0"/>
+          <a:chExt cx="0" cy="0"/>
+        </a:xfrm>
+      </p:grpSpPr>
+      <p:sp>
+        <p:nvSpPr>
+          <p:cNvPr id="2" name="Title 1"/>
+          <p:cNvSpPr>
+            <a:spLocks noGrp="1"/>
+          </p:cNvSpPr>
+          <p:nvPr>
+            <p:ph type="ctrTitle"/>
+          </p:nvPr>
+        </p:nvSpPr>
+        <p:spPr/>
+        <p:txBody>
+          <a:bodyPr/>
+          <a:lstStyle/>
+          <a:p>
+            <a:pPr algn="ctr"/>
+            <a:r>
+              <a:rPr lang="en-US" dirty="0" smtClean="0"/>
+              <a:t>LinkedIn</a:t>
+            </a:r>
+            <a:endParaRPr lang="en-US" dirty="0"/>
+          </a:p>
+        </p:txBody>
+      </p:sp>
+      <p:sp>
+        <p:nvSpPr>
+          <p:cNvPr id="4" name="Subtitle 3"/>
+          <p:cNvSpPr>
+            <a:spLocks noGrp="1"/>
+          </p:cNvSpPr>
+          <p:nvPr>
+            <p:ph type="subTitle" idx="1"/>
+          </p:nvPr>
+        </p:nvSpPr>
+        <p:spPr/>
+        <p:txBody>
+          <a:bodyPr/>
+          <a:lstStyle/>
+          <a:p>
+            <a:endParaRPr lang="en-US"/>
+          </a:p>
+        </p:txBody>
+      </p:sp>
+    </p:spTree>
+    <p:extLst>
+      <p:ext uri="{BB962C8B-B14F-4D97-AF65-F5344CB8AC3E}">
+        <p14:creationId xmlns:p14="http://schemas.microsoft.com/office/powerpoint/2010/main" val="1838135563"/>
       </p:ext>
     </p:extLst>
   </p:cSld>

</xml_diff>